<commit_message>
powerpoint for presentation roughly finished a part from reverseMgf
</commit_message>
<xml_diff>
--- a/SecondLabPresentation.pptx
+++ b/SecondLabPresentation.pptx
@@ -5,7 +5,7 @@
     <p:sldMasterId id="2147483702" r:id="rId1"/>
   </p:sldMasterIdLst>
   <p:notesMasterIdLst>
-    <p:notesMasterId r:id="rId28"/>
+    <p:notesMasterId r:id="rId32"/>
   </p:notesMasterIdLst>
   <p:sldIdLst>
     <p:sldId id="256" r:id="rId2"/>
@@ -32,8 +32,12 @@
     <p:sldId id="295" r:id="rId23"/>
     <p:sldId id="296" r:id="rId24"/>
     <p:sldId id="283" r:id="rId25"/>
-    <p:sldId id="284" r:id="rId26"/>
-    <p:sldId id="285" r:id="rId27"/>
+    <p:sldId id="285" r:id="rId26"/>
+    <p:sldId id="284" r:id="rId27"/>
+    <p:sldId id="297" r:id="rId28"/>
+    <p:sldId id="298" r:id="rId29"/>
+    <p:sldId id="299" r:id="rId30"/>
+    <p:sldId id="300" r:id="rId31"/>
   </p:sldIdLst>
   <p:sldSz cx="12192000" cy="6858000"/>
   <p:notesSz cx="6858000" cy="9144000"/>
@@ -573,6 +577,282 @@
 </p:notes>
 </file>
 
+<file path=ppt/notesSlides/notesSlide10.xml><?xml version="1.0" encoding="utf-8"?>
+<p:notes xmlns:a="http://schemas.openxmlformats.org/drawingml/2006/main" xmlns:r="http://schemas.openxmlformats.org/officeDocument/2006/relationships" xmlns:p="http://schemas.openxmlformats.org/presentationml/2006/main">
+  <p:cSld>
+    <p:spTree>
+      <p:nvGrpSpPr>
+        <p:cNvPr id="1" name=""/>
+        <p:cNvGrpSpPr/>
+        <p:nvPr/>
+      </p:nvGrpSpPr>
+      <p:grpSpPr>
+        <a:xfrm>
+          <a:off x="0" y="0"/>
+          <a:ext cx="0" cy="0"/>
+          <a:chOff x="0" y="0"/>
+          <a:chExt cx="0" cy="0"/>
+        </a:xfrm>
+      </p:grpSpPr>
+      <p:sp>
+        <p:nvSpPr>
+          <p:cNvPr id="2" name="Slide Image Placeholder 1"/>
+          <p:cNvSpPr>
+            <a:spLocks noGrp="1" noRot="1" noChangeAspect="1"/>
+          </p:cNvSpPr>
+          <p:nvPr>
+            <p:ph type="sldImg"/>
+          </p:nvPr>
+        </p:nvSpPr>
+        <p:spPr/>
+      </p:sp>
+      <p:sp>
+        <p:nvSpPr>
+          <p:cNvPr id="3" name="Notes Placeholder 2"/>
+          <p:cNvSpPr>
+            <a:spLocks noGrp="1"/>
+          </p:cNvSpPr>
+          <p:nvPr>
+            <p:ph type="body" idx="1"/>
+          </p:nvPr>
+        </p:nvSpPr>
+        <p:spPr/>
+        <p:txBody>
+          <a:bodyPr/>
+          <a:lstStyle/>
+          <a:p>
+            <a:r>
+              <a:rPr lang="en-US" dirty="0" smtClean="0"/>
+              <a:t>Conducted</a:t>
+            </a:r>
+            <a:r>
+              <a:rPr lang="en-US" baseline="0" dirty="0" smtClean="0"/>
+              <a:t> with min trans cleavage length equal to 6. Explain the affect this has on the output with respect to what cis and </a:t>
+            </a:r>
+            <a:r>
+              <a:rPr lang="en-US" baseline="0" dirty="0" err="1" smtClean="0"/>
+              <a:t>lin</a:t>
+            </a:r>
+            <a:r>
+              <a:rPr lang="en-US" baseline="0" dirty="0" smtClean="0"/>
+              <a:t> looks like.</a:t>
+            </a:r>
+            <a:endParaRPr lang="en-US" dirty="0"/>
+          </a:p>
+        </p:txBody>
+      </p:sp>
+      <p:sp>
+        <p:nvSpPr>
+          <p:cNvPr id="4" name="Slide Number Placeholder 3"/>
+          <p:cNvSpPr>
+            <a:spLocks noGrp="1"/>
+          </p:cNvSpPr>
+          <p:nvPr>
+            <p:ph type="sldNum" sz="quarter" idx="10"/>
+          </p:nvPr>
+        </p:nvSpPr>
+        <p:spPr/>
+        <p:txBody>
+          <a:bodyPr/>
+          <a:lstStyle/>
+          <a:p>
+            <a:fld id="{7E9FF854-EBCF-BA4F-BEA7-33B6A492EBD7}" type="slidenum">
+              <a:rPr lang="en-US" smtClean="0"/>
+              <a:t>23</a:t>
+            </a:fld>
+            <a:endParaRPr lang="en-US"/>
+          </a:p>
+        </p:txBody>
+      </p:sp>
+    </p:spTree>
+    <p:extLst>
+      <p:ext uri="{BB962C8B-B14F-4D97-AF65-F5344CB8AC3E}">
+        <p14:creationId xmlns:p14="http://schemas.microsoft.com/office/powerpoint/2010/main" val="1840087678"/>
+      </p:ext>
+    </p:extLst>
+  </p:cSld>
+  <p:clrMapOvr>
+    <a:masterClrMapping/>
+  </p:clrMapOvr>
+</p:notes>
+</file>
+
+<file path=ppt/notesSlides/notesSlide11.xml><?xml version="1.0" encoding="utf-8"?>
+<p:notes xmlns:a="http://schemas.openxmlformats.org/drawingml/2006/main" xmlns:r="http://schemas.openxmlformats.org/officeDocument/2006/relationships" xmlns:p="http://schemas.openxmlformats.org/presentationml/2006/main">
+  <p:cSld>
+    <p:spTree>
+      <p:nvGrpSpPr>
+        <p:cNvPr id="1" name=""/>
+        <p:cNvGrpSpPr/>
+        <p:nvPr/>
+      </p:nvGrpSpPr>
+      <p:grpSpPr>
+        <a:xfrm>
+          <a:off x="0" y="0"/>
+          <a:ext cx="0" cy="0"/>
+          <a:chOff x="0" y="0"/>
+          <a:chExt cx="0" cy="0"/>
+        </a:xfrm>
+      </p:grpSpPr>
+      <p:sp>
+        <p:nvSpPr>
+          <p:cNvPr id="2" name="Slide Image Placeholder 1"/>
+          <p:cNvSpPr>
+            <a:spLocks noGrp="1" noRot="1" noChangeAspect="1"/>
+          </p:cNvSpPr>
+          <p:nvPr>
+            <p:ph type="sldImg"/>
+          </p:nvPr>
+        </p:nvSpPr>
+        <p:spPr/>
+      </p:sp>
+      <p:sp>
+        <p:nvSpPr>
+          <p:cNvPr id="3" name="Notes Placeholder 2"/>
+          <p:cNvSpPr>
+            <a:spLocks noGrp="1"/>
+          </p:cNvSpPr>
+          <p:nvPr>
+            <p:ph type="body" idx="1"/>
+          </p:nvPr>
+        </p:nvSpPr>
+        <p:spPr/>
+        <p:txBody>
+          <a:bodyPr/>
+          <a:lstStyle/>
+          <a:p>
+            <a:endParaRPr lang="en-US" dirty="0"/>
+          </a:p>
+        </p:txBody>
+      </p:sp>
+      <p:sp>
+        <p:nvSpPr>
+          <p:cNvPr id="4" name="Slide Number Placeholder 3"/>
+          <p:cNvSpPr>
+            <a:spLocks noGrp="1"/>
+          </p:cNvSpPr>
+          <p:nvPr>
+            <p:ph type="sldNum" sz="quarter" idx="10"/>
+          </p:nvPr>
+        </p:nvSpPr>
+        <p:spPr/>
+        <p:txBody>
+          <a:bodyPr/>
+          <a:lstStyle/>
+          <a:p>
+            <a:fld id="{7E9FF854-EBCF-BA4F-BEA7-33B6A492EBD7}" type="slidenum">
+              <a:rPr lang="en-US" smtClean="0"/>
+              <a:t>26</a:t>
+            </a:fld>
+            <a:endParaRPr lang="en-US"/>
+          </a:p>
+        </p:txBody>
+      </p:sp>
+    </p:spTree>
+    <p:extLst>
+      <p:ext uri="{BB962C8B-B14F-4D97-AF65-F5344CB8AC3E}">
+        <p14:creationId xmlns:p14="http://schemas.microsoft.com/office/powerpoint/2010/main" val="874657782"/>
+      </p:ext>
+    </p:extLst>
+  </p:cSld>
+  <p:clrMapOvr>
+    <a:masterClrMapping/>
+  </p:clrMapOvr>
+</p:notes>
+</file>
+
+<file path=ppt/notesSlides/notesSlide12.xml><?xml version="1.0" encoding="utf-8"?>
+<p:notes xmlns:a="http://schemas.openxmlformats.org/drawingml/2006/main" xmlns:r="http://schemas.openxmlformats.org/officeDocument/2006/relationships" xmlns:p="http://schemas.openxmlformats.org/presentationml/2006/main">
+  <p:cSld>
+    <p:spTree>
+      <p:nvGrpSpPr>
+        <p:cNvPr id="1" name=""/>
+        <p:cNvGrpSpPr/>
+        <p:nvPr/>
+      </p:nvGrpSpPr>
+      <p:grpSpPr>
+        <a:xfrm>
+          <a:off x="0" y="0"/>
+          <a:ext cx="0" cy="0"/>
+          <a:chOff x="0" y="0"/>
+          <a:chExt cx="0" cy="0"/>
+        </a:xfrm>
+      </p:grpSpPr>
+      <p:sp>
+        <p:nvSpPr>
+          <p:cNvPr id="2" name="Slide Image Placeholder 1"/>
+          <p:cNvSpPr>
+            <a:spLocks noGrp="1" noRot="1" noChangeAspect="1"/>
+          </p:cNvSpPr>
+          <p:nvPr>
+            <p:ph type="sldImg"/>
+          </p:nvPr>
+        </p:nvSpPr>
+        <p:spPr/>
+      </p:sp>
+      <p:sp>
+        <p:nvSpPr>
+          <p:cNvPr id="3" name="Notes Placeholder 2"/>
+          <p:cNvSpPr>
+            <a:spLocks noGrp="1"/>
+          </p:cNvSpPr>
+          <p:nvPr>
+            <p:ph type="body" idx="1"/>
+          </p:nvPr>
+        </p:nvSpPr>
+        <p:spPr/>
+        <p:txBody>
+          <a:bodyPr/>
+          <a:lstStyle/>
+          <a:p>
+            <a:r>
+              <a:rPr lang="en-US" dirty="0" smtClean="0"/>
+              <a:t>Emma</a:t>
+            </a:r>
+            <a:r>
+              <a:rPr lang="en-US" baseline="0" dirty="0" smtClean="0"/>
+              <a:t> went through this in some detail a few weeks ago so we aren’t going to again.</a:t>
+            </a:r>
+            <a:endParaRPr lang="en-US" dirty="0"/>
+          </a:p>
+        </p:txBody>
+      </p:sp>
+      <p:sp>
+        <p:nvSpPr>
+          <p:cNvPr id="4" name="Slide Number Placeholder 3"/>
+          <p:cNvSpPr>
+            <a:spLocks noGrp="1"/>
+          </p:cNvSpPr>
+          <p:nvPr>
+            <p:ph type="sldNum" sz="quarter" idx="10"/>
+          </p:nvPr>
+        </p:nvSpPr>
+        <p:spPr/>
+        <p:txBody>
+          <a:bodyPr/>
+          <a:lstStyle/>
+          <a:p>
+            <a:fld id="{7E9FF854-EBCF-BA4F-BEA7-33B6A492EBD7}" type="slidenum">
+              <a:rPr lang="en-US" smtClean="0"/>
+              <a:t>27</a:t>
+            </a:fld>
+            <a:endParaRPr lang="en-US"/>
+          </a:p>
+        </p:txBody>
+      </p:sp>
+    </p:spTree>
+    <p:extLst>
+      <p:ext uri="{BB962C8B-B14F-4D97-AF65-F5344CB8AC3E}">
+        <p14:creationId xmlns:p14="http://schemas.microsoft.com/office/powerpoint/2010/main" val="260164155"/>
+      </p:ext>
+    </p:extLst>
+  </p:cSld>
+  <p:clrMapOvr>
+    <a:masterClrMapping/>
+  </p:clrMapOvr>
+</p:notes>
+</file>
+
 <file path=ppt/notesSlides/notesSlide2.xml><?xml version="1.0" encoding="utf-8"?>
 <p:notes xmlns:a="http://schemas.openxmlformats.org/drawingml/2006/main" xmlns:r="http://schemas.openxmlformats.org/officeDocument/2006/relationships" xmlns:p="http://schemas.openxmlformats.org/presentationml/2006/main">
   <p:cSld>
@@ -1289,7 +1569,7 @@
           <a:bodyPr/>
           <a:lstStyle/>
           <a:p>
-            <a:endParaRPr lang="en-US"/>
+            <a:endParaRPr lang="en-US" dirty="0"/>
           </a:p>
         </p:txBody>
       </p:sp>
@@ -10385,11 +10665,13 @@
             </a:r>
             <a:r>
               <a:rPr lang="en-US" dirty="0" smtClean="0"/>
-              <a:t>trans</a:t>
-            </a:r>
-            <a:r>
-              <a:rPr lang="en-US" dirty="0" smtClean="0"/>
-              <a:t>.</a:t>
+              <a:t>trans.</a:t>
+            </a:r>
+          </a:p>
+          <a:p>
+            <a:r>
+              <a:rPr lang="en-US" dirty="0" smtClean="0"/>
+              <a:t>Leucine and Isoleucine are considered identical.</a:t>
             </a:r>
             <a:endParaRPr lang="en-US" dirty="0" smtClean="0"/>
           </a:p>
@@ -10480,6 +10762,30 @@
           </a:p>
         </p:txBody>
       </p:sp>
+      <p:pic>
+        <p:nvPicPr>
+          <p:cNvPr id="5" name="Picture 4"/>
+          <p:cNvPicPr>
+            <a:picLocks noChangeAspect="1"/>
+          </p:cNvPicPr>
+          <p:nvPr/>
+        </p:nvPicPr>
+        <p:blipFill>
+          <a:blip r:embed="rId2"/>
+          <a:stretch>
+            <a:fillRect/>
+          </a:stretch>
+        </p:blipFill>
+        <p:spPr>
+          <a:xfrm>
+            <a:off x="3900525" y="1835591"/>
+            <a:ext cx="4178300" cy="4292600"/>
+          </a:xfrm>
+          <a:prstGeom prst="rect">
+            <a:avLst/>
+          </a:prstGeom>
+        </p:spPr>
+      </p:pic>
     </p:spTree>
     <p:extLst>
       <p:ext uri="{BB962C8B-B14F-4D97-AF65-F5344CB8AC3E}">
@@ -10541,6 +10847,30 @@
           </a:p>
         </p:txBody>
       </p:sp>
+      <p:pic>
+        <p:nvPicPr>
+          <p:cNvPr id="4" name="Picture 3"/>
+          <p:cNvPicPr>
+            <a:picLocks noChangeAspect="1"/>
+          </p:cNvPicPr>
+          <p:nvPr/>
+        </p:nvPicPr>
+        <p:blipFill>
+          <a:blip r:embed="rId2"/>
+          <a:stretch>
+            <a:fillRect/>
+          </a:stretch>
+        </p:blipFill>
+        <p:spPr>
+          <a:xfrm>
+            <a:off x="3716109" y="1649820"/>
+            <a:ext cx="4432300" cy="4559300"/>
+          </a:xfrm>
+          <a:prstGeom prst="rect">
+            <a:avLst/>
+          </a:prstGeom>
+        </p:spPr>
+      </p:pic>
     </p:spTree>
     <p:extLst>
       <p:ext uri="{BB962C8B-B14F-4D97-AF65-F5344CB8AC3E}">
@@ -10602,6 +10932,30 @@
           </a:p>
         </p:txBody>
       </p:sp>
+      <p:pic>
+        <p:nvPicPr>
+          <p:cNvPr id="6" name="Picture 5"/>
+          <p:cNvPicPr>
+            <a:picLocks noChangeAspect="1"/>
+          </p:cNvPicPr>
+          <p:nvPr/>
+        </p:nvPicPr>
+        <p:blipFill>
+          <a:blip r:embed="rId3"/>
+          <a:stretch>
+            <a:fillRect/>
+          </a:stretch>
+        </p:blipFill>
+        <p:spPr>
+          <a:xfrm>
+            <a:off x="3859912" y="1639186"/>
+            <a:ext cx="4497277" cy="4357610"/>
+          </a:xfrm>
+          <a:prstGeom prst="rect">
+            <a:avLst/>
+          </a:prstGeom>
+        </p:spPr>
+      </p:pic>
     </p:spTree>
     <p:extLst>
       <p:ext uri="{BB962C8B-B14F-4D97-AF65-F5344CB8AC3E}">
@@ -10731,7 +11085,7 @@
           <a:p>
             <a:r>
               <a:rPr lang="en-US" dirty="0" smtClean="0"/>
-              <a:t>Machine Learning</a:t>
+              <a:t>Future Work on These Programs</a:t>
             </a:r>
             <a:endParaRPr lang="en-US" dirty="0"/>
           </a:p>
@@ -10752,14 +11106,44 @@
           <a:bodyPr/>
           <a:lstStyle/>
           <a:p>
-            <a:endParaRPr lang="en-US"/>
+            <a:r>
+              <a:rPr lang="en-US" dirty="0" smtClean="0"/>
+              <a:t>Run time tests on Reverse MGF and Reverse Splice</a:t>
+            </a:r>
+          </a:p>
+          <a:p>
+            <a:r>
+              <a:rPr lang="en-US" dirty="0" smtClean="0"/>
+              <a:t>Possibly look to incorporate the Splicing Program memory threshold checking and process generation</a:t>
+            </a:r>
+          </a:p>
+          <a:p>
+            <a:r>
+              <a:rPr lang="en-US" dirty="0" smtClean="0"/>
+              <a:t>Documentation</a:t>
+            </a:r>
+            <a:r>
+              <a:rPr lang="mr-IN" dirty="0" smtClean="0"/>
+              <a:t>…</a:t>
+            </a:r>
+            <a:r>
+              <a:rPr lang="en-AU" dirty="0" smtClean="0"/>
+              <a:t>.</a:t>
+            </a:r>
+          </a:p>
+          <a:p>
+            <a:r>
+              <a:rPr lang="en-AU" dirty="0" smtClean="0"/>
+              <a:t>Look to run on MASSIVE is feasible</a:t>
+            </a:r>
+            <a:endParaRPr lang="en-US" dirty="0"/>
           </a:p>
         </p:txBody>
       </p:sp>
     </p:spTree>
     <p:extLst>
       <p:ext uri="{BB962C8B-B14F-4D97-AF65-F5344CB8AC3E}">
-        <p14:creationId xmlns:p14="http://schemas.microsoft.com/office/powerpoint/2010/main" val="1604011163"/>
+        <p14:creationId xmlns:p14="http://schemas.microsoft.com/office/powerpoint/2010/main" val="215760013"/>
       </p:ext>
     </p:extLst>
   </p:cSld>
@@ -10803,7 +11187,7 @@
           <a:p>
             <a:r>
               <a:rPr lang="en-US" dirty="0" smtClean="0"/>
-              <a:t>Future Work on These Programs</a:t>
+              <a:t>Machine Learning</a:t>
             </a:r>
             <a:endParaRPr lang="en-US" dirty="0"/>
           </a:p>
@@ -10819,19 +11203,580 @@
             <p:ph idx="1"/>
           </p:nvPr>
         </p:nvSpPr>
-        <p:spPr/>
+        <p:spPr>
+          <a:xfrm>
+            <a:off x="2185174" y="2133600"/>
+            <a:ext cx="5810509" cy="3777622"/>
+          </a:xfrm>
+        </p:spPr>
         <p:txBody>
           <a:bodyPr/>
           <a:lstStyle/>
           <a:p>
-            <a:endParaRPr lang="en-US"/>
-          </a:p>
-        </p:txBody>
-      </p:sp>
+            <a:r>
+              <a:rPr lang="en-US" dirty="0" smtClean="0"/>
+              <a:t>Predict b/y ion intensity based on </a:t>
+            </a:r>
+            <a:r>
+              <a:rPr lang="en-US" dirty="0" smtClean="0"/>
+              <a:t>the precursor sequence and b/y ion sequence.</a:t>
+            </a:r>
+          </a:p>
+          <a:p>
+            <a:r>
+              <a:rPr lang="en-US" dirty="0" smtClean="0"/>
+              <a:t>Currently ion intensities are not used effectively in the peptide prediction process.</a:t>
+            </a:r>
+          </a:p>
+          <a:p>
+            <a:pPr lvl="1"/>
+            <a:r>
+              <a:rPr lang="en-US" dirty="0" smtClean="0"/>
+              <a:t>We have only been using m/z of spectra in our program.</a:t>
+            </a:r>
+          </a:p>
+          <a:p>
+            <a:r>
+              <a:rPr lang="en-US" dirty="0" smtClean="0"/>
+              <a:t>A number of projects have successfully used ion sequence data to predict intensity.</a:t>
+            </a:r>
+          </a:p>
+          <a:p>
+            <a:pPr lvl="1"/>
+            <a:r>
+              <a:rPr lang="en-US" dirty="0" smtClean="0"/>
+              <a:t>To incorporate it into our programs we were hoping to specifically do so for b/y ions.</a:t>
+            </a:r>
+          </a:p>
+        </p:txBody>
+      </p:sp>
+      <p:pic>
+        <p:nvPicPr>
+          <p:cNvPr id="4" name="Picture 3"/>
+          <p:cNvPicPr>
+            <a:picLocks noChangeAspect="1"/>
+          </p:cNvPicPr>
+          <p:nvPr/>
+        </p:nvPicPr>
+        <p:blipFill rotWithShape="1">
+          <a:blip r:embed="rId3"/>
+          <a:srcRect t="1" r="57984" b="42906"/>
+          <a:stretch/>
+        </p:blipFill>
+        <p:spPr>
+          <a:xfrm>
+            <a:off x="8313242" y="2027275"/>
+            <a:ext cx="2425642" cy="3352800"/>
+          </a:xfrm>
+          <a:prstGeom prst="rect">
+            <a:avLst/>
+          </a:prstGeom>
+        </p:spPr>
+      </p:pic>
     </p:spTree>
     <p:extLst>
       <p:ext uri="{BB962C8B-B14F-4D97-AF65-F5344CB8AC3E}">
-        <p14:creationId xmlns:p14="http://schemas.microsoft.com/office/powerpoint/2010/main" val="215760013"/>
+        <p14:creationId xmlns:p14="http://schemas.microsoft.com/office/powerpoint/2010/main" val="1604011163"/>
+      </p:ext>
+    </p:extLst>
+  </p:cSld>
+  <p:clrMapOvr>
+    <a:masterClrMapping/>
+  </p:clrMapOvr>
+</p:sld>
+</file>
+
+<file path=ppt/slides/slide27.xml><?xml version="1.0" encoding="utf-8"?>
+<p:sld xmlns:a="http://schemas.openxmlformats.org/drawingml/2006/main" xmlns:r="http://schemas.openxmlformats.org/officeDocument/2006/relationships" xmlns:p="http://schemas.openxmlformats.org/presentationml/2006/main">
+  <p:cSld>
+    <p:spTree>
+      <p:nvGrpSpPr>
+        <p:cNvPr id="1" name=""/>
+        <p:cNvGrpSpPr/>
+        <p:nvPr/>
+      </p:nvGrpSpPr>
+      <p:grpSpPr>
+        <a:xfrm>
+          <a:off x="0" y="0"/>
+          <a:ext cx="0" cy="0"/>
+          <a:chOff x="0" y="0"/>
+          <a:chExt cx="0" cy="0"/>
+        </a:xfrm>
+      </p:grpSpPr>
+      <p:sp>
+        <p:nvSpPr>
+          <p:cNvPr id="2" name="Title 1"/>
+          <p:cNvSpPr>
+            <a:spLocks noGrp="1"/>
+          </p:cNvSpPr>
+          <p:nvPr>
+            <p:ph type="title"/>
+          </p:nvPr>
+        </p:nvSpPr>
+        <p:spPr>
+          <a:xfrm>
+            <a:off x="2125092" y="581580"/>
+            <a:ext cx="9599075" cy="1280890"/>
+          </a:xfrm>
+        </p:spPr>
+        <p:txBody>
+          <a:bodyPr/>
+          <a:lstStyle/>
+          <a:p>
+            <a:r>
+              <a:rPr lang="en-US" dirty="0" smtClean="0"/>
+              <a:t>Machine Learning </a:t>
+            </a:r>
+            <a:r>
+              <a:rPr lang="mr-IN" dirty="0" smtClean="0"/>
+              <a:t>–</a:t>
+            </a:r>
+            <a:r>
+              <a:rPr lang="en-US" dirty="0" smtClean="0"/>
+              <a:t> Basic Neural Network</a:t>
+            </a:r>
+            <a:endParaRPr lang="en-US" dirty="0"/>
+          </a:p>
+        </p:txBody>
+      </p:sp>
+      <p:sp>
+        <p:nvSpPr>
+          <p:cNvPr id="4" name="Content Placeholder 3"/>
+          <p:cNvSpPr>
+            <a:spLocks noGrp="1"/>
+          </p:cNvSpPr>
+          <p:nvPr>
+            <p:ph idx="1"/>
+          </p:nvPr>
+        </p:nvSpPr>
+        <p:spPr>
+          <a:xfrm>
+            <a:off x="2125092" y="2110146"/>
+            <a:ext cx="5061282" cy="3777622"/>
+          </a:xfrm>
+        </p:spPr>
+        <p:txBody>
+          <a:bodyPr/>
+          <a:lstStyle/>
+          <a:p>
+            <a:r>
+              <a:rPr lang="en-US" dirty="0" smtClean="0"/>
+              <a:t>Early attempts to solve this problem used simple neural nets with 1 or two hidden layers.</a:t>
+            </a:r>
+          </a:p>
+          <a:p>
+            <a:r>
+              <a:rPr lang="en-US" dirty="0" smtClean="0"/>
+              <a:t>It was shown to improve peptide recognition when incorporated into existing workflows.</a:t>
+            </a:r>
+            <a:endParaRPr lang="en-US" dirty="0"/>
+          </a:p>
+        </p:txBody>
+      </p:sp>
+      <p:pic>
+        <p:nvPicPr>
+          <p:cNvPr id="1026" name="Picture 2" descr="mage result for neural network"/>
+          <p:cNvPicPr>
+            <a:picLocks noChangeAspect="1" noChangeArrowheads="1"/>
+          </p:cNvPicPr>
+          <p:nvPr/>
+        </p:nvPicPr>
+        <p:blipFill>
+          <a:blip r:embed="rId3">
+            <a:extLst>
+              <a:ext uri="{28A0092B-C50C-407E-A947-70E740481C1C}">
+                <a14:useLocalDpi xmlns:a14="http://schemas.microsoft.com/office/drawing/2010/main" val="0"/>
+              </a:ext>
+            </a:extLst>
+          </a:blip>
+          <a:srcRect/>
+          <a:stretch>
+            <a:fillRect/>
+          </a:stretch>
+        </p:blipFill>
+        <p:spPr bwMode="auto">
+          <a:xfrm>
+            <a:off x="7505351" y="1667372"/>
+            <a:ext cx="3680284" cy="4425542"/>
+          </a:xfrm>
+          <a:prstGeom prst="rect">
+            <a:avLst/>
+          </a:prstGeom>
+          <a:noFill/>
+          <a:extLst>
+            <a:ext uri="{909E8E84-426E-40DD-AFC4-6F175D3DCCD1}">
+              <a14:hiddenFill xmlns:a14="http://schemas.microsoft.com/office/drawing/2010/main">
+                <a:solidFill>
+                  <a:srgbClr val="FFFFFF"/>
+                </a:solidFill>
+              </a14:hiddenFill>
+            </a:ext>
+          </a:extLst>
+        </p:spPr>
+      </p:pic>
+    </p:spTree>
+    <p:extLst>
+      <p:ext uri="{BB962C8B-B14F-4D97-AF65-F5344CB8AC3E}">
+        <p14:creationId xmlns:p14="http://schemas.microsoft.com/office/powerpoint/2010/main" val="681961593"/>
+      </p:ext>
+    </p:extLst>
+  </p:cSld>
+  <p:clrMapOvr>
+    <a:masterClrMapping/>
+  </p:clrMapOvr>
+  <p:timing>
+    <p:tnLst>
+      <p:par>
+        <p:cTn id="1" dur="indefinite" restart="never" nodeType="tmRoot"/>
+      </p:par>
+    </p:tnLst>
+  </p:timing>
+</p:sld>
+</file>
+
+<file path=ppt/slides/slide28.xml><?xml version="1.0" encoding="utf-8"?>
+<p:sld xmlns:a="http://schemas.openxmlformats.org/drawingml/2006/main" xmlns:r="http://schemas.openxmlformats.org/officeDocument/2006/relationships" xmlns:p="http://schemas.openxmlformats.org/presentationml/2006/main">
+  <p:cSld>
+    <p:spTree>
+      <p:nvGrpSpPr>
+        <p:cNvPr id="1" name=""/>
+        <p:cNvGrpSpPr/>
+        <p:nvPr/>
+      </p:nvGrpSpPr>
+      <p:grpSpPr>
+        <a:xfrm>
+          <a:off x="0" y="0"/>
+          <a:ext cx="0" cy="0"/>
+          <a:chOff x="0" y="0"/>
+          <a:chExt cx="0" cy="0"/>
+        </a:xfrm>
+      </p:grpSpPr>
+      <p:sp>
+        <p:nvSpPr>
+          <p:cNvPr id="2" name="Title 1"/>
+          <p:cNvSpPr>
+            <a:spLocks noGrp="1"/>
+          </p:cNvSpPr>
+          <p:nvPr>
+            <p:ph type="title"/>
+          </p:nvPr>
+        </p:nvSpPr>
+        <p:spPr/>
+        <p:txBody>
+          <a:bodyPr/>
+          <a:lstStyle/>
+          <a:p>
+            <a:r>
+              <a:rPr lang="en-US" dirty="0"/>
+              <a:t>Machine Learning </a:t>
+            </a:r>
+            <a:r>
+              <a:rPr lang="mr-IN" dirty="0" smtClean="0"/>
+              <a:t>–</a:t>
+            </a:r>
+            <a:r>
+              <a:rPr lang="en-US" dirty="0" smtClean="0"/>
+              <a:t> Recurrent Neural Networks</a:t>
+            </a:r>
+            <a:endParaRPr lang="en-US" dirty="0"/>
+          </a:p>
+        </p:txBody>
+      </p:sp>
+      <p:sp>
+        <p:nvSpPr>
+          <p:cNvPr id="3" name="Content Placeholder 2"/>
+          <p:cNvSpPr>
+            <a:spLocks noGrp="1"/>
+          </p:cNvSpPr>
+          <p:nvPr>
+            <p:ph idx="1"/>
+          </p:nvPr>
+        </p:nvSpPr>
+        <p:spPr>
+          <a:xfrm>
+            <a:off x="2334029" y="1905000"/>
+            <a:ext cx="8915400" cy="3777622"/>
+          </a:xfrm>
+        </p:spPr>
+        <p:txBody>
+          <a:bodyPr/>
+          <a:lstStyle/>
+          <a:p>
+            <a:r>
+              <a:rPr lang="en-US" dirty="0" smtClean="0"/>
+              <a:t>More recent work has shown recurrent neural networks are superior for intensity prediction.</a:t>
+            </a:r>
+          </a:p>
+          <a:p>
+            <a:r>
+              <a:rPr lang="en-US" dirty="0" smtClean="0"/>
+              <a:t>Instead of taking an individual input and calculating the output, recurrent networks take a set of inputs and calculate the corresponding set of outputs simultaneously.</a:t>
+            </a:r>
+          </a:p>
+          <a:p>
+            <a:pPr lvl="1"/>
+            <a:r>
+              <a:rPr lang="en-US" dirty="0" smtClean="0"/>
+              <a:t>They take into account the result of the previous output when calculating a given output</a:t>
+            </a:r>
+          </a:p>
+          <a:p>
+            <a:r>
+              <a:rPr lang="en-US" dirty="0" smtClean="0"/>
+              <a:t>Such a network would be able to predict how the intensities of a previous b/y ion pair affect the intensities of the next pair. </a:t>
+            </a:r>
+            <a:endParaRPr lang="en-US" dirty="0"/>
+          </a:p>
+        </p:txBody>
+      </p:sp>
+      <p:pic>
+        <p:nvPicPr>
+          <p:cNvPr id="2050" name="Picture 2" descr="mage result for b/y ions"/>
+          <p:cNvPicPr>
+            <a:picLocks noChangeAspect="1" noChangeArrowheads="1"/>
+          </p:cNvPicPr>
+          <p:nvPr/>
+        </p:nvPicPr>
+        <p:blipFill>
+          <a:blip r:embed="rId2">
+            <a:extLst>
+              <a:ext uri="{28A0092B-C50C-407E-A947-70E740481C1C}">
+                <a14:useLocalDpi xmlns:a14="http://schemas.microsoft.com/office/drawing/2010/main" val="0"/>
+              </a:ext>
+            </a:extLst>
+          </a:blip>
+          <a:srcRect/>
+          <a:stretch>
+            <a:fillRect/>
+          </a:stretch>
+        </p:blipFill>
+        <p:spPr bwMode="auto">
+          <a:xfrm>
+            <a:off x="4051006" y="4834823"/>
+            <a:ext cx="4433775" cy="1684990"/>
+          </a:xfrm>
+          <a:prstGeom prst="rect">
+            <a:avLst/>
+          </a:prstGeom>
+          <a:noFill/>
+          <a:extLst>
+            <a:ext uri="{909E8E84-426E-40DD-AFC4-6F175D3DCCD1}">
+              <a14:hiddenFill xmlns:a14="http://schemas.microsoft.com/office/drawing/2010/main">
+                <a:solidFill>
+                  <a:srgbClr val="FFFFFF"/>
+                </a:solidFill>
+              </a14:hiddenFill>
+            </a:ext>
+          </a:extLst>
+        </p:spPr>
+      </p:pic>
+    </p:spTree>
+    <p:extLst>
+      <p:ext uri="{BB962C8B-B14F-4D97-AF65-F5344CB8AC3E}">
+        <p14:creationId xmlns:p14="http://schemas.microsoft.com/office/powerpoint/2010/main" val="496892694"/>
+      </p:ext>
+    </p:extLst>
+  </p:cSld>
+  <p:clrMapOvr>
+    <a:masterClrMapping/>
+  </p:clrMapOvr>
+  <p:timing>
+    <p:tnLst>
+      <p:par>
+        <p:cTn id="1" dur="indefinite" restart="never" nodeType="tmRoot"/>
+      </p:par>
+    </p:tnLst>
+  </p:timing>
+</p:sld>
+</file>
+
+<file path=ppt/slides/slide29.xml><?xml version="1.0" encoding="utf-8"?>
+<p:sld xmlns:a="http://schemas.openxmlformats.org/drawingml/2006/main" xmlns:r="http://schemas.openxmlformats.org/officeDocument/2006/relationships" xmlns:p="http://schemas.openxmlformats.org/presentationml/2006/main">
+  <p:cSld>
+    <p:spTree>
+      <p:nvGrpSpPr>
+        <p:cNvPr id="1" name=""/>
+        <p:cNvGrpSpPr/>
+        <p:nvPr/>
+      </p:nvGrpSpPr>
+      <p:grpSpPr>
+        <a:xfrm>
+          <a:off x="0" y="0"/>
+          <a:ext cx="0" cy="0"/>
+          <a:chOff x="0" y="0"/>
+          <a:chExt cx="0" cy="0"/>
+        </a:xfrm>
+      </p:grpSpPr>
+      <p:sp>
+        <p:nvSpPr>
+          <p:cNvPr id="2" name="Title 1"/>
+          <p:cNvSpPr>
+            <a:spLocks noGrp="1"/>
+          </p:cNvSpPr>
+          <p:nvPr>
+            <p:ph type="title"/>
+          </p:nvPr>
+        </p:nvSpPr>
+        <p:spPr/>
+        <p:txBody>
+          <a:bodyPr/>
+          <a:lstStyle/>
+          <a:p>
+            <a:r>
+              <a:rPr lang="en-US" dirty="0" smtClean="0"/>
+              <a:t>Machine Learning </a:t>
+            </a:r>
+            <a:r>
+              <a:rPr lang="mr-IN" dirty="0" smtClean="0"/>
+              <a:t>–</a:t>
+            </a:r>
+            <a:r>
+              <a:rPr lang="en-US" dirty="0" smtClean="0"/>
+              <a:t> Our Proposed Model</a:t>
+            </a:r>
+            <a:endParaRPr lang="en-US" dirty="0"/>
+          </a:p>
+        </p:txBody>
+      </p:sp>
+      <p:sp>
+        <p:nvSpPr>
+          <p:cNvPr id="3" name="Content Placeholder 2"/>
+          <p:cNvSpPr>
+            <a:spLocks noGrp="1"/>
+          </p:cNvSpPr>
+          <p:nvPr>
+            <p:ph idx="1"/>
+          </p:nvPr>
+        </p:nvSpPr>
+        <p:spPr>
+          <a:xfrm>
+            <a:off x="2291500" y="1984745"/>
+            <a:ext cx="8915400" cy="4681870"/>
+          </a:xfrm>
+        </p:spPr>
+        <p:txBody>
+          <a:bodyPr>
+            <a:normAutofit fontScale="92500" lnSpcReduction="10000"/>
+          </a:bodyPr>
+          <a:lstStyle/>
+          <a:p>
+            <a:r>
+              <a:rPr lang="en-US" dirty="0" smtClean="0"/>
+              <a:t>Bi-lateral recurrent neural network: considers the output before AND after when calculating a given predicted intensity</a:t>
+            </a:r>
+          </a:p>
+          <a:p>
+            <a:r>
+              <a:rPr lang="en-US" dirty="0" smtClean="0"/>
+              <a:t>Treat a b/y ion cleavage site as a unique input</a:t>
+            </a:r>
+          </a:p>
+          <a:p>
+            <a:r>
+              <a:rPr lang="en-US" dirty="0"/>
+              <a:t>For each protein we have a set cleavage site </a:t>
+            </a:r>
+            <a:r>
+              <a:rPr lang="en-US" dirty="0" smtClean="0"/>
+              <a:t>inputs which is fed into the network</a:t>
+            </a:r>
+          </a:p>
+          <a:p>
+            <a:r>
+              <a:rPr lang="en-US" dirty="0" smtClean="0"/>
+              <a:t>Each input includes the following data:</a:t>
+            </a:r>
+          </a:p>
+          <a:p>
+            <a:pPr lvl="1"/>
+            <a:r>
+              <a:rPr lang="en-US" dirty="0" smtClean="0"/>
+              <a:t>Encoded precursor sequence </a:t>
+            </a:r>
+          </a:p>
+          <a:p>
+            <a:pPr lvl="1"/>
+            <a:r>
+              <a:rPr lang="en-US" dirty="0" err="1" smtClean="0"/>
+              <a:t>Normalised</a:t>
+            </a:r>
+            <a:r>
+              <a:rPr lang="en-US" dirty="0"/>
+              <a:t> </a:t>
+            </a:r>
+            <a:r>
+              <a:rPr lang="en-US" dirty="0" smtClean="0"/>
+              <a:t>precursor mass</a:t>
+            </a:r>
+          </a:p>
+          <a:p>
+            <a:pPr lvl="1"/>
+            <a:r>
+              <a:rPr lang="en-US" dirty="0" err="1" smtClean="0"/>
+              <a:t>Normalised</a:t>
+            </a:r>
+            <a:r>
+              <a:rPr lang="en-US" dirty="0" smtClean="0"/>
+              <a:t> precursor length</a:t>
+            </a:r>
+          </a:p>
+          <a:p>
+            <a:pPr lvl="1"/>
+            <a:r>
+              <a:rPr lang="en-US" dirty="0" smtClean="0"/>
+              <a:t>Encoded first and last amino acids</a:t>
+            </a:r>
+          </a:p>
+          <a:p>
+            <a:pPr lvl="1"/>
+            <a:r>
+              <a:rPr lang="en-US" dirty="0" err="1" smtClean="0"/>
+              <a:t>Normalised</a:t>
+            </a:r>
+            <a:r>
+              <a:rPr lang="en-US" dirty="0" smtClean="0"/>
+              <a:t> b/y ion lengths</a:t>
+            </a:r>
+          </a:p>
+          <a:p>
+            <a:pPr lvl="1"/>
+            <a:r>
+              <a:rPr lang="en-US" dirty="0" err="1" smtClean="0"/>
+              <a:t>Normalised</a:t>
+            </a:r>
+            <a:r>
+              <a:rPr lang="en-US" dirty="0" smtClean="0"/>
+              <a:t> b/y ion mass</a:t>
+            </a:r>
+          </a:p>
+          <a:p>
+            <a:pPr lvl="1"/>
+            <a:r>
+              <a:rPr lang="en-US" dirty="0" err="1" smtClean="0"/>
+              <a:t>Normalised</a:t>
+            </a:r>
+            <a:r>
+              <a:rPr lang="en-US" dirty="0" smtClean="0"/>
+              <a:t> cleavage site number</a:t>
+            </a:r>
+          </a:p>
+          <a:p>
+            <a:pPr lvl="1"/>
+            <a:r>
+              <a:rPr lang="en-US" dirty="0" smtClean="0"/>
+              <a:t>Encoded amino acids either side of cleavage site</a:t>
+            </a:r>
+          </a:p>
+          <a:p>
+            <a:pPr lvl="1"/>
+            <a:endParaRPr lang="en-US" dirty="0"/>
+          </a:p>
+        </p:txBody>
+      </p:sp>
+    </p:spTree>
+    <p:extLst>
+      <p:ext uri="{BB962C8B-B14F-4D97-AF65-F5344CB8AC3E}">
+        <p14:creationId xmlns:p14="http://schemas.microsoft.com/office/powerpoint/2010/main" val="110450862"/>
       </p:ext>
     </p:extLst>
   </p:cSld>
@@ -10908,6 +11853,107 @@
     <p:extLst>
       <p:ext uri="{BB962C8B-B14F-4D97-AF65-F5344CB8AC3E}">
         <p14:creationId xmlns:p14="http://schemas.microsoft.com/office/powerpoint/2010/main" val="151048883"/>
+      </p:ext>
+    </p:extLst>
+  </p:cSld>
+  <p:clrMapOvr>
+    <a:masterClrMapping/>
+  </p:clrMapOvr>
+</p:sld>
+</file>
+
+<file path=ppt/slides/slide30.xml><?xml version="1.0" encoding="utf-8"?>
+<p:sld xmlns:a="http://schemas.openxmlformats.org/drawingml/2006/main" xmlns:r="http://schemas.openxmlformats.org/officeDocument/2006/relationships" xmlns:p="http://schemas.openxmlformats.org/presentationml/2006/main">
+  <p:cSld>
+    <p:spTree>
+      <p:nvGrpSpPr>
+        <p:cNvPr id="1" name=""/>
+        <p:cNvGrpSpPr/>
+        <p:nvPr/>
+      </p:nvGrpSpPr>
+      <p:grpSpPr>
+        <a:xfrm>
+          <a:off x="0" y="0"/>
+          <a:ext cx="0" cy="0"/>
+          <a:chOff x="0" y="0"/>
+          <a:chExt cx="0" cy="0"/>
+        </a:xfrm>
+      </p:grpSpPr>
+      <p:sp>
+        <p:nvSpPr>
+          <p:cNvPr id="2" name="Title 1"/>
+          <p:cNvSpPr>
+            <a:spLocks noGrp="1"/>
+          </p:cNvSpPr>
+          <p:nvPr>
+            <p:ph type="title"/>
+          </p:nvPr>
+        </p:nvSpPr>
+        <p:spPr/>
+        <p:txBody>
+          <a:bodyPr/>
+          <a:lstStyle/>
+          <a:p>
+            <a:r>
+              <a:rPr lang="en-US" dirty="0" smtClean="0"/>
+              <a:t>Machine Learning - Progress</a:t>
+            </a:r>
+            <a:endParaRPr lang="en-US" dirty="0"/>
+          </a:p>
+        </p:txBody>
+      </p:sp>
+      <p:sp>
+        <p:nvSpPr>
+          <p:cNvPr id="3" name="Content Placeholder 2"/>
+          <p:cNvSpPr>
+            <a:spLocks noGrp="1"/>
+          </p:cNvSpPr>
+          <p:nvPr>
+            <p:ph idx="1"/>
+          </p:nvPr>
+        </p:nvSpPr>
+        <p:spPr/>
+        <p:txBody>
+          <a:bodyPr/>
+          <a:lstStyle/>
+          <a:p>
+            <a:r>
+              <a:rPr lang="en-US" dirty="0" smtClean="0"/>
+              <a:t>We have written the basic code to to create the network.</a:t>
+            </a:r>
+          </a:p>
+          <a:p>
+            <a:r>
+              <a:rPr lang="en-US" dirty="0" smtClean="0"/>
+              <a:t>Haven’t had time to fine tune the model and set hyper parameters.</a:t>
+            </a:r>
+          </a:p>
+          <a:p>
+            <a:pPr lvl="1"/>
+            <a:r>
+              <a:rPr lang="en-US" dirty="0" smtClean="0"/>
+              <a:t>This is the real challenge in neural network design.</a:t>
+            </a:r>
+          </a:p>
+          <a:p>
+            <a:r>
+              <a:rPr lang="en-US" dirty="0" smtClean="0"/>
+              <a:t>Ideally, the neural network would be incorporated into our other programs to provide more confident matches between MGF spectra and potential peptides.</a:t>
+            </a:r>
+          </a:p>
+          <a:p>
+            <a:pPr lvl="1"/>
+            <a:r>
+              <a:rPr lang="en-US" dirty="0" smtClean="0"/>
+              <a:t>This is a big task, and we likely won’t have time.</a:t>
+            </a:r>
+          </a:p>
+        </p:txBody>
+      </p:sp>
+    </p:spTree>
+    <p:extLst>
+      <p:ext uri="{BB962C8B-B14F-4D97-AF65-F5344CB8AC3E}">
+        <p14:creationId xmlns:p14="http://schemas.microsoft.com/office/powerpoint/2010/main" val="465668823"/>
       </p:ext>
     </p:extLst>
   </p:cSld>

</xml_diff>

<commit_message>
Just added reverse mgf photo
</commit_message>
<xml_diff>
--- a/SecondLabPresentation.pptx
+++ b/SecondLabPresentation.pptx
@@ -226,7 +226,7 @@
           <a:p>
             <a:fld id="{136FA2C8-1A04-C04C-AAB5-5AEF43C22034}" type="datetimeFigureOut">
               <a:rPr lang="en-US" smtClean="0"/>
-              <a:t>3/27/19</a:t>
+              <a:t>4/1/2019</a:t>
             </a:fld>
             <a:endParaRPr lang="en-US"/>
           </a:p>
@@ -622,19 +622,19 @@
           <a:lstStyle/>
           <a:p>
             <a:r>
-              <a:rPr lang="en-US" dirty="0" smtClean="0"/>
+              <a:rPr lang="en-US" dirty="0"/>
               <a:t>Conducted</a:t>
             </a:r>
             <a:r>
-              <a:rPr lang="en-US" baseline="0" dirty="0" smtClean="0"/>
+              <a:rPr lang="en-US" baseline="0" dirty="0"/>
               <a:t> with min trans cleavage length equal to 6. Explain the affect this has on the output with respect to what cis and </a:t>
             </a:r>
             <a:r>
-              <a:rPr lang="en-US" baseline="0" dirty="0" err="1" smtClean="0"/>
+              <a:rPr lang="en-US" baseline="0" dirty="0" err="1"/>
               <a:t>lin</a:t>
             </a:r>
             <a:r>
-              <a:rPr lang="en-US" baseline="0" dirty="0" smtClean="0"/>
+              <a:rPr lang="en-US" baseline="0" dirty="0"/>
               <a:t> looks like.</a:t>
             </a:r>
             <a:endParaRPr lang="en-US" dirty="0"/>
@@ -721,7 +721,7 @@
           <a:bodyPr/>
           <a:lstStyle/>
           <a:p>
-            <a:endParaRPr lang="en-US" dirty="0"/>
+            <a:endParaRPr lang="en-AU" dirty="0"/>
           </a:p>
         </p:txBody>
       </p:sp>
@@ -732,7 +732,7 @@
             <a:spLocks noGrp="1"/>
           </p:cNvSpPr>
           <p:nvPr>
-            <p:ph type="sldNum" sz="quarter" idx="10"/>
+            <p:ph type="sldNum" sz="quarter" idx="5"/>
           </p:nvPr>
         </p:nvSpPr>
         <p:spPr/>
@@ -742,7 +742,7 @@
           <a:p>
             <a:fld id="{7E9FF854-EBCF-BA4F-BEA7-33B6A492EBD7}" type="slidenum">
               <a:rPr lang="en-US" smtClean="0"/>
-              <a:t>26</a:t>
+              <a:t>24</a:t>
             </a:fld>
             <a:endParaRPr lang="en-US"/>
           </a:p>
@@ -751,7 +751,7 @@
     </p:spTree>
     <p:extLst>
       <p:ext uri="{BB962C8B-B14F-4D97-AF65-F5344CB8AC3E}">
-        <p14:creationId xmlns:p14="http://schemas.microsoft.com/office/powerpoint/2010/main" val="874657782"/>
+        <p14:creationId xmlns:p14="http://schemas.microsoft.com/office/powerpoint/2010/main" val="3735461603"/>
       </p:ext>
     </p:extLst>
   </p:cSld>
@@ -805,12 +805,96 @@
           <a:bodyPr/>
           <a:lstStyle/>
           <a:p>
-            <a:r>
-              <a:rPr lang="en-US" dirty="0" smtClean="0"/>
+            <a:endParaRPr lang="en-US" dirty="0"/>
+          </a:p>
+        </p:txBody>
+      </p:sp>
+      <p:sp>
+        <p:nvSpPr>
+          <p:cNvPr id="4" name="Slide Number Placeholder 3"/>
+          <p:cNvSpPr>
+            <a:spLocks noGrp="1"/>
+          </p:cNvSpPr>
+          <p:nvPr>
+            <p:ph type="sldNum" sz="quarter" idx="10"/>
+          </p:nvPr>
+        </p:nvSpPr>
+        <p:spPr/>
+        <p:txBody>
+          <a:bodyPr/>
+          <a:lstStyle/>
+          <a:p>
+            <a:fld id="{7E9FF854-EBCF-BA4F-BEA7-33B6A492EBD7}" type="slidenum">
+              <a:rPr lang="en-US" smtClean="0"/>
+              <a:t>26</a:t>
+            </a:fld>
+            <a:endParaRPr lang="en-US"/>
+          </a:p>
+        </p:txBody>
+      </p:sp>
+    </p:spTree>
+    <p:extLst>
+      <p:ext uri="{BB962C8B-B14F-4D97-AF65-F5344CB8AC3E}">
+        <p14:creationId xmlns:p14="http://schemas.microsoft.com/office/powerpoint/2010/main" val="874657782"/>
+      </p:ext>
+    </p:extLst>
+  </p:cSld>
+  <p:clrMapOvr>
+    <a:masterClrMapping/>
+  </p:clrMapOvr>
+</p:notes>
+</file>
+
+<file path=ppt/notesSlides/notesSlide13.xml><?xml version="1.0" encoding="utf-8"?>
+<p:notes xmlns:a="http://schemas.openxmlformats.org/drawingml/2006/main" xmlns:r="http://schemas.openxmlformats.org/officeDocument/2006/relationships" xmlns:p="http://schemas.openxmlformats.org/presentationml/2006/main">
+  <p:cSld>
+    <p:spTree>
+      <p:nvGrpSpPr>
+        <p:cNvPr id="1" name=""/>
+        <p:cNvGrpSpPr/>
+        <p:nvPr/>
+      </p:nvGrpSpPr>
+      <p:grpSpPr>
+        <a:xfrm>
+          <a:off x="0" y="0"/>
+          <a:ext cx="0" cy="0"/>
+          <a:chOff x="0" y="0"/>
+          <a:chExt cx="0" cy="0"/>
+        </a:xfrm>
+      </p:grpSpPr>
+      <p:sp>
+        <p:nvSpPr>
+          <p:cNvPr id="2" name="Slide Image Placeholder 1"/>
+          <p:cNvSpPr>
+            <a:spLocks noGrp="1" noRot="1" noChangeAspect="1"/>
+          </p:cNvSpPr>
+          <p:nvPr>
+            <p:ph type="sldImg"/>
+          </p:nvPr>
+        </p:nvSpPr>
+        <p:spPr/>
+      </p:sp>
+      <p:sp>
+        <p:nvSpPr>
+          <p:cNvPr id="3" name="Notes Placeholder 2"/>
+          <p:cNvSpPr>
+            <a:spLocks noGrp="1"/>
+          </p:cNvSpPr>
+          <p:nvPr>
+            <p:ph type="body" idx="1"/>
+          </p:nvPr>
+        </p:nvSpPr>
+        <p:spPr/>
+        <p:txBody>
+          <a:bodyPr/>
+          <a:lstStyle/>
+          <a:p>
+            <a:r>
+              <a:rPr lang="en-US" dirty="0"/>
               <a:t>Emma</a:t>
             </a:r>
             <a:r>
-              <a:rPr lang="en-US" baseline="0" dirty="0" smtClean="0"/>
+              <a:rPr lang="en-US" baseline="0" dirty="0"/>
               <a:t> went through this in some detail a few weeks ago so we aren’t going to again.</a:t>
             </a:r>
             <a:endParaRPr lang="en-US" dirty="0"/>
@@ -1292,10 +1376,9 @@
           <a:lstStyle/>
           <a:p>
             <a:r>
-              <a:rPr lang="en-US" dirty="0" smtClean="0"/>
+              <a:rPr lang="en-US" dirty="0"/>
               <a:t>Elaborate on each one.</a:t>
             </a:r>
-            <a:endParaRPr lang="en-US" dirty="0"/>
           </a:p>
         </p:txBody>
       </p:sp>
@@ -1380,20 +1463,19 @@
           <a:lstStyle/>
           <a:p>
             <a:r>
-              <a:rPr lang="en-US" dirty="0" smtClean="0"/>
+              <a:rPr lang="en-US" dirty="0"/>
               <a:t>Explain what</a:t>
             </a:r>
             <a:r>
-              <a:rPr lang="en-US" baseline="0" dirty="0" smtClean="0"/>
+              <a:rPr lang="en-US" baseline="0" dirty="0"/>
               <a:t> is meant by origin: which proteins the cleavages which were combined to create the peptide were from.</a:t>
             </a:r>
           </a:p>
           <a:p>
             <a:r>
-              <a:rPr lang="en-US" dirty="0" smtClean="0"/>
+              <a:rPr lang="en-US" dirty="0"/>
               <a:t>Explain overlap</a:t>
             </a:r>
-            <a:endParaRPr lang="en-US" dirty="0"/>
           </a:p>
         </p:txBody>
       </p:sp>
@@ -1478,11 +1560,11 @@
           <a:lstStyle/>
           <a:p>
             <a:r>
-              <a:rPr lang="en-US" dirty="0" smtClean="0"/>
+              <a:rPr lang="en-US" dirty="0"/>
               <a:t>Explain</a:t>
             </a:r>
             <a:r>
-              <a:rPr lang="en-US" baseline="0" dirty="0" smtClean="0"/>
+              <a:rPr lang="en-US" baseline="0" dirty="0"/>
               <a:t> that the count is not entirely accurate.</a:t>
             </a:r>
             <a:endParaRPr lang="en-US" dirty="0"/>
@@ -1797,7 +1879,7 @@
           <a:p>
             <a:fld id="{C65CC5F2-8C20-4D41-A30F-E08EA3FD74AE}" type="datetimeFigureOut">
               <a:rPr lang="en-US" smtClean="0"/>
-              <a:t>3/27/19</a:t>
+              <a:t>4/1/2019</a:t>
             </a:fld>
             <a:endParaRPr lang="en-US"/>
           </a:p>
@@ -2130,7 +2212,7 @@
           <a:p>
             <a:fld id="{C65CC5F2-8C20-4D41-A30F-E08EA3FD74AE}" type="datetimeFigureOut">
               <a:rPr lang="en-US" smtClean="0"/>
-              <a:t>3/27/19</a:t>
+              <a:t>4/1/2019</a:t>
             </a:fld>
             <a:endParaRPr lang="en-US"/>
           </a:p>
@@ -2526,7 +2608,7 @@
           <a:p>
             <a:fld id="{C65CC5F2-8C20-4D41-A30F-E08EA3FD74AE}" type="datetimeFigureOut">
               <a:rPr lang="en-US" smtClean="0"/>
-              <a:t>3/27/19</a:t>
+              <a:t>4/1/2019</a:t>
             </a:fld>
             <a:endParaRPr lang="en-US"/>
           </a:p>
@@ -2857,7 +2939,7 @@
           <a:p>
             <a:fld id="{C65CC5F2-8C20-4D41-A30F-E08EA3FD74AE}" type="datetimeFigureOut">
               <a:rPr lang="en-US" smtClean="0"/>
-              <a:t>3/27/19</a:t>
+              <a:t>4/1/2019</a:t>
             </a:fld>
             <a:endParaRPr lang="en-US"/>
           </a:p>
@@ -3172,7 +3254,7 @@
           <a:p>
             <a:fld id="{C65CC5F2-8C20-4D41-A30F-E08EA3FD74AE}" type="datetimeFigureOut">
               <a:rPr lang="en-US" smtClean="0"/>
-              <a:t>3/27/19</a:t>
+              <a:t>4/1/2019</a:t>
             </a:fld>
             <a:endParaRPr lang="en-US"/>
           </a:p>
@@ -3563,7 +3645,7 @@
           <a:p>
             <a:fld id="{C65CC5F2-8C20-4D41-A30F-E08EA3FD74AE}" type="datetimeFigureOut">
               <a:rPr lang="en-US" smtClean="0"/>
-              <a:t>3/27/19</a:t>
+              <a:t>4/1/2019</a:t>
             </a:fld>
             <a:endParaRPr lang="en-US"/>
           </a:p>
@@ -3815,7 +3897,7 @@
           <a:p>
             <a:fld id="{C65CC5F2-8C20-4D41-A30F-E08EA3FD74AE}" type="datetimeFigureOut">
               <a:rPr lang="en-US" smtClean="0"/>
-              <a:t>3/27/19</a:t>
+              <a:t>4/1/2019</a:t>
             </a:fld>
             <a:endParaRPr lang="en-US"/>
           </a:p>
@@ -4072,7 +4154,7 @@
           <a:p>
             <a:fld id="{C65CC5F2-8C20-4D41-A30F-E08EA3FD74AE}" type="datetimeFigureOut">
               <a:rPr lang="en-US" smtClean="0"/>
-              <a:t>3/27/19</a:t>
+              <a:t>4/1/2019</a:t>
             </a:fld>
             <a:endParaRPr lang="en-US"/>
           </a:p>
@@ -4329,7 +4411,7 @@
           <a:p>
             <a:fld id="{C65CC5F2-8C20-4D41-A30F-E08EA3FD74AE}" type="datetimeFigureOut">
               <a:rPr lang="en-US" smtClean="0"/>
-              <a:t>3/27/19</a:t>
+              <a:t>4/1/2019</a:t>
             </a:fld>
             <a:endParaRPr lang="en-US"/>
           </a:p>
@@ -4653,7 +4735,7 @@
           <a:p>
             <a:fld id="{C65CC5F2-8C20-4D41-A30F-E08EA3FD74AE}" type="datetimeFigureOut">
               <a:rPr lang="en-US" smtClean="0"/>
-              <a:t>3/27/19</a:t>
+              <a:t>4/1/2019</a:t>
             </a:fld>
             <a:endParaRPr lang="en-US"/>
           </a:p>
@@ -4971,7 +5053,7 @@
           <a:p>
             <a:fld id="{C65CC5F2-8C20-4D41-A30F-E08EA3FD74AE}" type="datetimeFigureOut">
               <a:rPr lang="en-US" smtClean="0"/>
-              <a:t>3/27/19</a:t>
+              <a:t>4/1/2019</a:t>
             </a:fld>
             <a:endParaRPr lang="en-US"/>
           </a:p>
@@ -5423,7 +5505,7 @@
           <a:p>
             <a:fld id="{C65CC5F2-8C20-4D41-A30F-E08EA3FD74AE}" type="datetimeFigureOut">
               <a:rPr lang="en-US" smtClean="0"/>
-              <a:t>3/27/19</a:t>
+              <a:t>4/1/2019</a:t>
             </a:fld>
             <a:endParaRPr lang="en-US"/>
           </a:p>
@@ -5623,7 +5705,7 @@
           <a:p>
             <a:fld id="{C65CC5F2-8C20-4D41-A30F-E08EA3FD74AE}" type="datetimeFigureOut">
               <a:rPr lang="en-US" smtClean="0"/>
-              <a:t>3/27/19</a:t>
+              <a:t>4/1/2019</a:t>
             </a:fld>
             <a:endParaRPr lang="en-US"/>
           </a:p>
@@ -5795,7 +5877,7 @@
           <a:p>
             <a:fld id="{C65CC5F2-8C20-4D41-A30F-E08EA3FD74AE}" type="datetimeFigureOut">
               <a:rPr lang="en-US" smtClean="0"/>
-              <a:t>3/27/19</a:t>
+              <a:t>4/1/2019</a:t>
             </a:fld>
             <a:endParaRPr lang="en-US"/>
           </a:p>
@@ -6123,7 +6205,7 @@
           <a:p>
             <a:fld id="{C65CC5F2-8C20-4D41-A30F-E08EA3FD74AE}" type="datetimeFigureOut">
               <a:rPr lang="en-US" smtClean="0"/>
-              <a:t>3/27/19</a:t>
+              <a:t>4/1/2019</a:t>
             </a:fld>
             <a:endParaRPr lang="en-US"/>
           </a:p>
@@ -6463,7 +6545,7 @@
           <a:p>
             <a:fld id="{C65CC5F2-8C20-4D41-A30F-E08EA3FD74AE}" type="datetimeFigureOut">
               <a:rPr lang="en-US" smtClean="0"/>
-              <a:t>3/27/19</a:t>
+              <a:t>4/1/2019</a:t>
             </a:fld>
             <a:endParaRPr lang="en-US"/>
           </a:p>
@@ -8575,7 +8657,7 @@
           <a:p>
             <a:fld id="{C65CC5F2-8C20-4D41-A30F-E08EA3FD74AE}" type="datetimeFigureOut">
               <a:rPr lang="en-US" smtClean="0"/>
-              <a:t>3/27/19</a:t>
+              <a:t>4/1/2019</a:t>
             </a:fld>
             <a:endParaRPr lang="en-US"/>
           </a:p>
@@ -9183,18 +9265,17 @@
           <a:lstStyle/>
           <a:p>
             <a:r>
-              <a:rPr lang="en-US" dirty="0" smtClean="0"/>
+              <a:rPr lang="en-US" dirty="0"/>
               <a:t>New Functions </a:t>
             </a:r>
             <a:r>
-              <a:rPr lang="mr-IN" dirty="0" smtClean="0"/>
+              <a:rPr lang="mr-IN" dirty="0"/>
               <a:t>–</a:t>
             </a:r>
             <a:r>
-              <a:rPr lang="en-US" dirty="0" smtClean="0"/>
+              <a:rPr lang="en-US" dirty="0"/>
               <a:t> Trans Origins</a:t>
             </a:r>
-            <a:endParaRPr lang="en-US" dirty="0"/>
           </a:p>
         </p:txBody>
       </p:sp>
@@ -9220,34 +9301,34 @@
           </a:p>
           <a:p>
             <a:r>
-              <a:rPr lang="en-US" dirty="0" smtClean="0"/>
+              <a:rPr lang="en-US" dirty="0"/>
               <a:t>Linear and cis splicing simply required a reference to the protein the peptide was derived from.</a:t>
             </a:r>
           </a:p>
           <a:p>
             <a:r>
-              <a:rPr lang="en-US" dirty="0" smtClean="0"/>
+              <a:rPr lang="en-US" dirty="0"/>
               <a:t>Trans peptides are from two peptides, so different syntax required.</a:t>
             </a:r>
           </a:p>
           <a:p>
             <a:pPr lvl="1"/>
             <a:r>
-              <a:rPr lang="en-US" dirty="0" smtClean="0"/>
+              <a:rPr lang="en-US" dirty="0"/>
               <a:t>Pairs of peptides separated by slash.</a:t>
             </a:r>
           </a:p>
           <a:p>
             <a:pPr lvl="1"/>
             <a:r>
-              <a:rPr lang="en-US" dirty="0" smtClean="0"/>
+              <a:rPr lang="en-US" dirty="0"/>
               <a:t>Brackets refer to the location of the cleavage within the peptide (only included for cleavages of more than 5)</a:t>
             </a:r>
           </a:p>
           <a:p>
             <a:pPr lvl="1"/>
             <a:r>
-              <a:rPr lang="en-US" dirty="0" smtClean="0"/>
+              <a:rPr lang="en-US" dirty="0"/>
               <a:t>“Overlap” peptides also considered trans splicing.</a:t>
             </a:r>
           </a:p>
@@ -9310,13 +9391,6 @@
   <p:clrMapOvr>
     <a:masterClrMapping/>
   </p:clrMapOvr>
-  <p:timing>
-    <p:tnLst>
-      <p:par>
-        <p:cTn id="1" dur="indefinite" restart="never" nodeType="tmRoot"/>
-      </p:par>
-    </p:tnLst>
-  </p:timing>
 </p:sld>
 </file>
 
@@ -9353,18 +9427,17 @@
           <a:lstStyle/>
           <a:p>
             <a:r>
-              <a:rPr lang="en-US" dirty="0" smtClean="0"/>
+              <a:rPr lang="en-US" dirty="0"/>
               <a:t>New Functions </a:t>
             </a:r>
             <a:r>
-              <a:rPr lang="mr-IN" dirty="0" smtClean="0"/>
+              <a:rPr lang="mr-IN" dirty="0"/>
               <a:t>–</a:t>
             </a:r>
             <a:r>
-              <a:rPr lang="en-US" dirty="0" smtClean="0"/>
+              <a:rPr lang="en-US" dirty="0"/>
               <a:t> Output CSV Files</a:t>
             </a:r>
-            <a:endParaRPr lang="en-US" dirty="0"/>
           </a:p>
         </p:txBody>
       </p:sp>
@@ -9392,15 +9465,7 @@
             <a:pPr lvl="1"/>
             <a:r>
               <a:rPr lang="en-US" dirty="0"/>
-              <a:t>Proteins as headers with all peptides </a:t>
-            </a:r>
-            <a:r>
-              <a:rPr lang="en-US" dirty="0" smtClean="0"/>
-              <a:t>from </a:t>
-            </a:r>
-            <a:r>
-              <a:rPr lang="en-US" dirty="0"/>
-              <a:t>that protein listed below.</a:t>
+              <a:t>Proteins as headers with all peptides from that protein listed below.</a:t>
             </a:r>
           </a:p>
           <a:p>
@@ -9508,18 +9573,17 @@
           <a:lstStyle/>
           <a:p>
             <a:r>
-              <a:rPr lang="en-US" dirty="0" smtClean="0"/>
+              <a:rPr lang="en-US" dirty="0"/>
               <a:t>New Functions </a:t>
             </a:r>
             <a:r>
-              <a:rPr lang="mr-IN" dirty="0" smtClean="0"/>
+              <a:rPr lang="mr-IN" dirty="0"/>
               <a:t>–</a:t>
             </a:r>
             <a:r>
-              <a:rPr lang="en-US" dirty="0" smtClean="0"/>
+              <a:rPr lang="en-US" dirty="0"/>
               <a:t> Info File</a:t>
             </a:r>
-            <a:endParaRPr lang="en-US" dirty="0"/>
           </a:p>
         </p:txBody>
       </p:sp>
@@ -9544,31 +9608,29 @@
           <a:lstStyle/>
           <a:p>
             <a:r>
-              <a:rPr lang="en-US" dirty="0" smtClean="0"/>
+              <a:rPr lang="en-US" dirty="0"/>
               <a:t>An info text file automatically prints when an output is run.</a:t>
             </a:r>
-            <a:endParaRPr lang="en-US" dirty="0"/>
-          </a:p>
-          <a:p>
-            <a:r>
-              <a:rPr lang="en-US" dirty="0" smtClean="0"/>
+          </a:p>
+          <a:p>
+            <a:r>
+              <a:rPr lang="en-US" dirty="0"/>
               <a:t>It contains:</a:t>
             </a:r>
           </a:p>
           <a:p>
             <a:pPr lvl="1"/>
             <a:r>
-              <a:rPr lang="en-US" dirty="0" smtClean="0"/>
+              <a:rPr lang="en-US" dirty="0"/>
               <a:t>The user selected settings.</a:t>
             </a:r>
           </a:p>
           <a:p>
             <a:pPr lvl="1"/>
             <a:r>
-              <a:rPr lang="en-US" dirty="0" smtClean="0"/>
+              <a:rPr lang="en-US" dirty="0"/>
               <a:t>A count of the number of times each selected modification was found in one of the output peptides.</a:t>
             </a:r>
-            <a:endParaRPr lang="en-US" dirty="0"/>
           </a:p>
           <a:p>
             <a:endParaRPr lang="en-US" dirty="0"/>
@@ -9585,13 +9647,6 @@
   <p:clrMapOvr>
     <a:masterClrMapping/>
   </p:clrMapOvr>
-  <p:timing>
-    <p:tnLst>
-      <p:par>
-        <p:cTn id="1" dur="indefinite" restart="never" nodeType="tmRoot"/>
-      </p:par>
-    </p:tnLst>
-  </p:timing>
 </p:sld>
 </file>
 
@@ -9657,10 +9712,9 @@
           <a:lstStyle/>
           <a:p>
             <a:r>
-              <a:rPr lang="en-US" dirty="0" smtClean="0"/>
+              <a:rPr lang="en-US" dirty="0"/>
               <a:t>Example of Info File</a:t>
             </a:r>
-            <a:endParaRPr lang="en-US" dirty="0"/>
           </a:p>
         </p:txBody>
       </p:sp>
@@ -9674,13 +9728,6 @@
   <p:clrMapOvr>
     <a:masterClrMapping/>
   </p:clrMapOvr>
-  <p:timing>
-    <p:tnLst>
-      <p:par>
-        <p:cTn id="1" dur="indefinite" restart="never" nodeType="tmRoot"/>
-      </p:par>
-    </p:tnLst>
-  </p:timing>
 </p:sld>
 </file>
 
@@ -9717,10 +9764,9 @@
           <a:lstStyle/>
           <a:p>
             <a:r>
-              <a:rPr lang="en-US" dirty="0" smtClean="0"/>
+              <a:rPr lang="en-US" dirty="0"/>
               <a:t>Current Tests</a:t>
             </a:r>
-            <a:endParaRPr lang="en-US" dirty="0"/>
           </a:p>
         </p:txBody>
       </p:sp>
@@ -9742,7 +9788,7 @@
           <a:lstStyle/>
           <a:p>
             <a:r>
-              <a:rPr lang="en-US" dirty="0" smtClean="0"/>
+              <a:rPr lang="en-US" dirty="0"/>
               <a:t>Human Proteome database as input FASTA against the following MGF files and settings:</a:t>
             </a:r>
           </a:p>
@@ -9750,86 +9796,62 @@
             <a:pPr lvl="1"/>
             <a:r>
               <a:rPr lang="en-US" dirty="0"/>
-              <a:t>A2: 7-16mers, 30%, 10ppm, 0.02Da, O(M), P(STY), +2, +</a:t>
-            </a:r>
-            <a:r>
-              <a:rPr lang="en-US" dirty="0" smtClean="0"/>
-              <a:t>3</a:t>
+              <a:t>A2: 7-16mers, 30%, 10ppm, 0.02Da, O(M), P(STY), +2, +3</a:t>
             </a:r>
           </a:p>
           <a:p>
             <a:pPr lvl="2"/>
             <a:r>
-              <a:rPr lang="en-US" dirty="0" smtClean="0"/>
+              <a:rPr lang="en-US" dirty="0"/>
               <a:t>5.5 hours.</a:t>
             </a:r>
           </a:p>
           <a:p>
             <a:pPr lvl="1"/>
             <a:r>
-              <a:rPr lang="en-US" dirty="0" smtClean="0"/>
-              <a:t>BLCL</a:t>
-            </a:r>
-            <a:r>
-              <a:rPr lang="en-US" dirty="0"/>
-              <a:t>: 7-16mers, 30%, 15ppm, 0.1Da, O(M), P(STY), +2, +</a:t>
-            </a:r>
-            <a:r>
-              <a:rPr lang="en-US" dirty="0" smtClean="0"/>
-              <a:t>3</a:t>
+              <a:rPr lang="en-US" dirty="0"/>
+              <a:t>BLCL: 7-16mers, 30%, 15ppm, 0.1Da, O(M), P(STY), +2, +3</a:t>
             </a:r>
           </a:p>
           <a:p>
             <a:pPr lvl="2"/>
             <a:r>
-              <a:rPr lang="en-US" dirty="0" smtClean="0"/>
+              <a:rPr lang="en-US" dirty="0"/>
               <a:t>4.5 hours</a:t>
             </a:r>
           </a:p>
           <a:p>
             <a:pPr lvl="1"/>
             <a:r>
-              <a:rPr lang="en-US" dirty="0" smtClean="0"/>
-              <a:t>B57: </a:t>
-            </a:r>
-            <a:r>
-              <a:rPr lang="en-US" dirty="0"/>
-              <a:t>7-15mers, 30%, 15ppm, 0.1Da, O(M), P(STY), +2, +</a:t>
-            </a:r>
-            <a:r>
-              <a:rPr lang="en-US" dirty="0" smtClean="0"/>
-              <a:t>3</a:t>
+              <a:rPr lang="en-US" dirty="0"/>
+              <a:t>B57: 7-15mers, 30%, 15ppm, 0.1Da, O(M), P(STY), +2, +3</a:t>
             </a:r>
           </a:p>
           <a:p>
             <a:pPr lvl="2"/>
             <a:r>
-              <a:rPr lang="en-US" dirty="0" smtClean="0"/>
+              <a:rPr lang="en-US" dirty="0"/>
               <a:t>9 hours.</a:t>
             </a:r>
           </a:p>
           <a:p>
             <a:r>
               <a:rPr lang="en-US" dirty="0"/>
-              <a:t>R</a:t>
-            </a:r>
-            <a:r>
-              <a:rPr lang="en-US" dirty="0" smtClean="0"/>
-              <a:t>an all reviewed proteins from </a:t>
-            </a:r>
-            <a:r>
-              <a:rPr lang="en-US" dirty="0" err="1" smtClean="0"/>
+              <a:t>Ran all reviewed proteins from </a:t>
+            </a:r>
+            <a:r>
+              <a:rPr lang="en-US" dirty="0" err="1"/>
               <a:t>Uniprot</a:t>
             </a:r>
             <a:r>
-              <a:rPr lang="en-US" dirty="0" smtClean="0"/>
+              <a:rPr lang="en-US" dirty="0"/>
               <a:t> with the A2 MGF and settings above.</a:t>
             </a:r>
           </a:p>
           <a:p>
             <a:pPr lvl="1"/>
             <a:r>
-              <a:rPr lang="en-US" dirty="0" smtClean="0"/>
+              <a:rPr lang="en-US" dirty="0"/>
               <a:t>Took almost exactly 4 days and produced X peptides</a:t>
             </a:r>
           </a:p>
@@ -9845,13 +9867,6 @@
   <p:clrMapOvr>
     <a:masterClrMapping/>
   </p:clrMapOvr>
-  <p:timing>
-    <p:tnLst>
-      <p:par>
-        <p:cTn id="1" dur="indefinite" restart="never" nodeType="tmRoot"/>
-      </p:par>
-    </p:tnLst>
-  </p:timing>
 </p:sld>
 </file>
 
@@ -9888,57 +9903,56 @@
           <a:lstStyle/>
           <a:p>
             <a:r>
-              <a:rPr lang="en-US" dirty="0" smtClean="0"/>
+              <a:rPr lang="en-US" dirty="0"/>
               <a:t>Future Work</a:t>
             </a:r>
+          </a:p>
+        </p:txBody>
+      </p:sp>
+      <p:sp>
+        <p:nvSpPr>
+          <p:cNvPr id="3" name="Content Placeholder 2"/>
+          <p:cNvSpPr>
+            <a:spLocks noGrp="1"/>
+          </p:cNvSpPr>
+          <p:nvPr>
+            <p:ph idx="1"/>
+          </p:nvPr>
+        </p:nvSpPr>
+        <p:spPr/>
+        <p:txBody>
+          <a:bodyPr/>
+          <a:lstStyle/>
+          <a:p>
+            <a:r>
+              <a:rPr lang="en-US" dirty="0"/>
+              <a:t>We ae in contact with MASSIVE to hopefully run the program on their system.</a:t>
+            </a:r>
+          </a:p>
+          <a:p>
+            <a:r>
+              <a:rPr lang="en-US" dirty="0"/>
+              <a:t>Documentation</a:t>
+            </a:r>
+            <a:r>
+              <a:rPr lang="mr-IN" dirty="0"/>
+              <a:t>…</a:t>
+            </a:r>
+            <a:r>
+              <a:rPr lang="en-AU" dirty="0"/>
+              <a:t>..</a:t>
+            </a:r>
+          </a:p>
+          <a:p>
+            <a:r>
+              <a:rPr lang="en-AU" dirty="0"/>
+              <a:t>Incorporation of Artificial Intelligence (discussed shortly).</a:t>
+            </a:r>
             <a:endParaRPr lang="en-US" dirty="0"/>
           </a:p>
-        </p:txBody>
-      </p:sp>
-      <p:sp>
-        <p:nvSpPr>
-          <p:cNvPr id="3" name="Content Placeholder 2"/>
-          <p:cNvSpPr>
-            <a:spLocks noGrp="1"/>
-          </p:cNvSpPr>
-          <p:nvPr>
-            <p:ph idx="1"/>
-          </p:nvPr>
-        </p:nvSpPr>
-        <p:spPr/>
-        <p:txBody>
-          <a:bodyPr/>
-          <a:lstStyle/>
-          <a:p>
-            <a:r>
-              <a:rPr lang="en-US" dirty="0" smtClean="0"/>
-              <a:t>We ae in contact with MASSIVE to hopefully run the program on their system.</a:t>
-            </a:r>
-          </a:p>
-          <a:p>
-            <a:r>
-              <a:rPr lang="en-US" dirty="0" smtClean="0"/>
-              <a:t>Documentation</a:t>
-            </a:r>
-            <a:r>
-              <a:rPr lang="mr-IN" dirty="0" smtClean="0"/>
-              <a:t>…</a:t>
-            </a:r>
-            <a:r>
-              <a:rPr lang="en-AU" dirty="0" smtClean="0"/>
-              <a:t>..</a:t>
-            </a:r>
-          </a:p>
-          <a:p>
-            <a:r>
-              <a:rPr lang="en-AU" dirty="0" smtClean="0"/>
-              <a:t>Incorporation of Artificial Intelligence (discussed shortly).</a:t>
-            </a:r>
-            <a:endParaRPr lang="en-US" dirty="0" smtClean="0"/>
-          </a:p>
-          <a:p>
-            <a:r>
-              <a:rPr lang="en-US" dirty="0" smtClean="0"/>
+          <a:p>
+            <a:r>
+              <a:rPr lang="en-US" dirty="0"/>
               <a:t>Incorporate the program into a workflow that improves peptide recognition.</a:t>
             </a:r>
           </a:p>
@@ -9990,53 +10004,52 @@
           <a:lstStyle/>
           <a:p>
             <a:r>
-              <a:rPr lang="en-US" dirty="0" smtClean="0"/>
+              <a:rPr lang="en-US" dirty="0"/>
               <a:t>Pre and Post Processing Programs</a:t>
             </a:r>
+          </a:p>
+        </p:txBody>
+      </p:sp>
+      <p:sp>
+        <p:nvSpPr>
+          <p:cNvPr id="3" name="Content Placeholder 2"/>
+          <p:cNvSpPr>
+            <a:spLocks noGrp="1"/>
+          </p:cNvSpPr>
+          <p:nvPr>
+            <p:ph idx="1"/>
+          </p:nvPr>
+        </p:nvSpPr>
+        <p:spPr/>
+        <p:txBody>
+          <a:bodyPr/>
+          <a:lstStyle/>
+          <a:p>
+            <a:r>
+              <a:rPr lang="en-US" dirty="0"/>
+              <a:t>6Frame Translation Pre-processing Program</a:t>
+            </a:r>
+          </a:p>
+          <a:p>
+            <a:r>
+              <a:rPr lang="en-US" dirty="0"/>
+              <a:t>Reverse Splicer Post Processing</a:t>
+            </a:r>
+          </a:p>
+          <a:p>
+            <a:r>
+              <a:rPr lang="en-US" dirty="0"/>
+              <a:t>Reverse MGF Post Processing</a:t>
+            </a:r>
+          </a:p>
+          <a:p>
+            <a:r>
+              <a:rPr lang="en-US" dirty="0"/>
+              <a:t>All these programs use similar multiprocessing, interfaces and logic to the original splicing program. </a:t>
+            </a:r>
+          </a:p>
+          <a:p>
             <a:endParaRPr lang="en-US" dirty="0"/>
-          </a:p>
-        </p:txBody>
-      </p:sp>
-      <p:sp>
-        <p:nvSpPr>
-          <p:cNvPr id="3" name="Content Placeholder 2"/>
-          <p:cNvSpPr>
-            <a:spLocks noGrp="1"/>
-          </p:cNvSpPr>
-          <p:nvPr>
-            <p:ph idx="1"/>
-          </p:nvPr>
-        </p:nvSpPr>
-        <p:spPr/>
-        <p:txBody>
-          <a:bodyPr/>
-          <a:lstStyle/>
-          <a:p>
-            <a:r>
-              <a:rPr lang="en-US" dirty="0" smtClean="0"/>
-              <a:t>6Frame Translation Pre-processing Program</a:t>
-            </a:r>
-          </a:p>
-          <a:p>
-            <a:r>
-              <a:rPr lang="en-US" dirty="0" smtClean="0"/>
-              <a:t>Reverse Splicer Post Processing</a:t>
-            </a:r>
-          </a:p>
-          <a:p>
-            <a:r>
-              <a:rPr lang="en-US" dirty="0" smtClean="0"/>
-              <a:t>Reverse MGF Post Processing</a:t>
-            </a:r>
-          </a:p>
-          <a:p>
-            <a:r>
-              <a:rPr lang="en-US" dirty="0" smtClean="0"/>
-              <a:t>All these programs use similar multiprocessing, interfaces and logic to the original splicing program. </a:t>
-            </a:r>
-          </a:p>
-          <a:p>
-            <a:endParaRPr lang="en-US" dirty="0" smtClean="0"/>
           </a:p>
           <a:p>
             <a:pPr lvl="1"/>
@@ -10090,10 +10103,9 @@
           <a:lstStyle/>
           <a:p>
             <a:r>
-              <a:rPr lang="en-US" dirty="0" smtClean="0"/>
+              <a:rPr lang="en-US" dirty="0"/>
               <a:t>6 Frame Translation Program</a:t>
             </a:r>
-            <a:endParaRPr lang="en-US" dirty="0"/>
           </a:p>
         </p:txBody>
       </p:sp>
@@ -10118,50 +10130,26 @@
           <a:lstStyle/>
           <a:p>
             <a:r>
-              <a:rPr lang="en-US" dirty="0" smtClean="0"/>
+              <a:rPr lang="en-US" dirty="0"/>
               <a:t>Takes an input FASTA file containing DNA sequences.</a:t>
             </a:r>
           </a:p>
           <a:p>
             <a:r>
-              <a:rPr lang="en-US" dirty="0" smtClean="0"/>
-              <a:t>Produces </a:t>
-            </a:r>
-            <a:r>
-              <a:rPr lang="en-US" dirty="0"/>
-              <a:t>all proteins over a minimum length that result from the 6 Frame Translation of </a:t>
-            </a:r>
-            <a:r>
-              <a:rPr lang="en-US" dirty="0" smtClean="0"/>
-              <a:t>the input sequences.</a:t>
-            </a:r>
-          </a:p>
-          <a:p>
-            <a:r>
-              <a:rPr lang="en-US" dirty="0" smtClean="0"/>
-              <a:t>Removes </a:t>
-            </a:r>
-            <a:r>
-              <a:rPr lang="en-US" dirty="0"/>
-              <a:t>proteins which exist as subsequences in longer proteins.</a:t>
-            </a:r>
-          </a:p>
-          <a:p>
-            <a:r>
-              <a:rPr lang="en-US" dirty="0"/>
-              <a:t>Aim to pass this output into our main splicing </a:t>
-            </a:r>
-            <a:r>
-              <a:rPr lang="en-US" dirty="0" smtClean="0"/>
-              <a:t>program</a:t>
-            </a:r>
-            <a:r>
-              <a:rPr lang="en-US" dirty="0"/>
-              <a:t> </a:t>
-            </a:r>
-            <a:r>
-              <a:rPr lang="en-US" dirty="0" smtClean="0"/>
-              <a:t>as proof that it can handle large data sets</a:t>
+              <a:rPr lang="en-US" dirty="0"/>
+              <a:t>Produces all proteins over a minimum length that result from the 6 Frame Translation of the input sequences.</a:t>
+            </a:r>
+          </a:p>
+          <a:p>
+            <a:r>
+              <a:rPr lang="en-US" dirty="0"/>
+              <a:t>Removes proteins which exist as subsequences in longer proteins.</a:t>
+            </a:r>
+          </a:p>
+          <a:p>
+            <a:r>
+              <a:rPr lang="en-US" dirty="0"/>
+              <a:t>Aim to pass this output into our main splicing program as proof that it can handle large data sets</a:t>
             </a:r>
           </a:p>
           <a:p>
@@ -10242,18 +10230,17 @@
           <a:lstStyle/>
           <a:p>
             <a:r>
-              <a:rPr lang="en-US" dirty="0" smtClean="0"/>
+              <a:rPr lang="en-US" dirty="0"/>
               <a:t>6 Frame Translation </a:t>
             </a:r>
             <a:r>
-              <a:rPr lang="mr-IN" dirty="0" smtClean="0"/>
+              <a:rPr lang="mr-IN" dirty="0"/>
               <a:t>–</a:t>
             </a:r>
             <a:r>
-              <a:rPr lang="en-US" dirty="0" smtClean="0"/>
+              <a:rPr lang="en-US" dirty="0"/>
               <a:t> Subset Deletion</a:t>
             </a:r>
-            <a:endParaRPr lang="en-US" dirty="0"/>
           </a:p>
         </p:txBody>
       </p:sp>
@@ -10273,25 +10260,25 @@
           <a:lstStyle/>
           <a:p>
             <a:r>
-              <a:rPr lang="en-US" dirty="0" smtClean="0"/>
+              <a:rPr lang="en-US" dirty="0"/>
               <a:t>Subset proteins provide no new peptides to the peptide splicing program.</a:t>
             </a:r>
           </a:p>
           <a:p>
             <a:r>
-              <a:rPr lang="en-US" dirty="0" smtClean="0"/>
+              <a:rPr lang="en-US" dirty="0"/>
               <a:t>However, they do provide additional origin locations.</a:t>
             </a:r>
           </a:p>
           <a:p>
             <a:r>
-              <a:rPr lang="en-US" dirty="0" smtClean="0"/>
+              <a:rPr lang="en-US" dirty="0"/>
               <a:t>Thus we included the option to print deleted subsequences.</a:t>
             </a:r>
           </a:p>
           <a:p>
             <a:r>
-              <a:rPr lang="en-US" dirty="0" smtClean="0"/>
+              <a:rPr lang="en-US" dirty="0"/>
               <a:t>Also prompted us to allow the user to ignore origin data to reduce the size of the output further.</a:t>
             </a:r>
           </a:p>
@@ -10343,18 +10330,17 @@
           <a:lstStyle/>
           <a:p>
             <a:r>
-              <a:rPr lang="en-US" dirty="0" smtClean="0"/>
+              <a:rPr lang="en-US" dirty="0"/>
               <a:t>6 Frame Translation </a:t>
             </a:r>
             <a:r>
-              <a:rPr lang="mr-IN" dirty="0" smtClean="0"/>
+              <a:rPr lang="mr-IN" dirty="0"/>
               <a:t>–</a:t>
             </a:r>
             <a:r>
-              <a:rPr lang="en-US" dirty="0" smtClean="0"/>
+              <a:rPr lang="en-US" dirty="0"/>
               <a:t> Current Tests</a:t>
             </a:r>
-            <a:endParaRPr lang="en-US" dirty="0"/>
           </a:p>
         </p:txBody>
       </p:sp>
@@ -10374,27 +10360,19 @@
           <a:lstStyle/>
           <a:p>
             <a:r>
-              <a:rPr lang="en-US" dirty="0" smtClean="0"/>
-              <a:t>We ran </a:t>
-            </a:r>
-            <a:r>
-              <a:rPr lang="en-US" dirty="0"/>
-              <a:t>the </a:t>
-            </a:r>
-            <a:r>
-              <a:rPr lang="en-US" dirty="0" smtClean="0"/>
-              <a:t>B57_1_S38_Merge.fasta</a:t>
-            </a:r>
-          </a:p>
-          <a:p>
-            <a:r>
-              <a:rPr lang="en-US" dirty="0" smtClean="0"/>
+              <a:rPr lang="en-US" dirty="0"/>
+              <a:t>We ran the B57_1_S38_Merge.fasta</a:t>
+            </a:r>
+          </a:p>
+          <a:p>
+            <a:r>
+              <a:rPr lang="en-US" dirty="0"/>
               <a:t>Produced an output of 73 million proteins in about 1.5 hours.</a:t>
             </a:r>
           </a:p>
           <a:p>
             <a:r>
-              <a:rPr lang="en-US" dirty="0" smtClean="0"/>
+              <a:rPr lang="en-US" dirty="0"/>
               <a:t>After removing subsets this output was reduced to 15 million proteins.</a:t>
             </a:r>
           </a:p>
@@ -10402,30 +10380,21 @@
             <a:pPr lvl="1"/>
             <a:r>
               <a:rPr lang="en-US" dirty="0"/>
-              <a:t>T</a:t>
-            </a:r>
-            <a:r>
-              <a:rPr lang="en-US" dirty="0" smtClean="0"/>
-              <a:t>ook an additional 3 hours.</a:t>
-            </a:r>
-          </a:p>
-          <a:p>
-            <a:r>
-              <a:rPr lang="en-US" dirty="0" smtClean="0"/>
-              <a:t>We are yet to run this </a:t>
-            </a:r>
-            <a:r>
-              <a:rPr lang="en-US" dirty="0" smtClean="0"/>
-              <a:t>through the splicing program.</a:t>
+              <a:t>Took an additional 3 hours.</a:t>
+            </a:r>
+          </a:p>
+          <a:p>
+            <a:r>
+              <a:rPr lang="en-US" dirty="0"/>
+              <a:t>We are yet to run this through the splicing program.</a:t>
             </a:r>
           </a:p>
           <a:p>
             <a:pPr lvl="1"/>
             <a:r>
-              <a:rPr lang="en-US" dirty="0" smtClean="0"/>
+              <a:rPr lang="en-US" dirty="0"/>
               <a:t>Initial tests suggest it will take 1-2 weeks on a 16 core computer.</a:t>
             </a:r>
-            <a:endParaRPr lang="en-US" dirty="0" smtClean="0"/>
           </a:p>
         </p:txBody>
       </p:sp>
@@ -10516,16 +10485,8 @@
           </a:p>
           <a:p>
             <a:r>
-              <a:rPr lang="en-US" dirty="0" smtClean="0"/>
-              <a:t>User </a:t>
-            </a:r>
-            <a:r>
-              <a:rPr lang="en-US" dirty="0"/>
-              <a:t>Interface allows the analysis to be dynamic and easily </a:t>
-            </a:r>
-            <a:r>
-              <a:rPr lang="en-US" dirty="0" smtClean="0"/>
-              <a:t>repeatable</a:t>
+              <a:rPr lang="en-US" dirty="0"/>
+              <a:t>User Interface allows the analysis to be dynamic and easily repeatable</a:t>
             </a:r>
           </a:p>
           <a:p>
@@ -10537,16 +10498,15 @@
           </a:p>
           <a:p>
             <a:r>
-              <a:rPr lang="en-US" dirty="0" smtClean="0"/>
+              <a:rPr lang="en-US" dirty="0"/>
               <a:t>We have introduced a number of pre and post processing programs.</a:t>
             </a:r>
           </a:p>
           <a:p>
             <a:r>
-              <a:rPr lang="en-US" dirty="0" smtClean="0"/>
-              <a:t>Investigated the use or machine learning in the context of our project.</a:t>
-            </a:r>
-            <a:endParaRPr lang="en-US" dirty="0"/>
+              <a:rPr lang="en-US" dirty="0"/>
+              <a:t>Investigated the use of machine learning in the context of our project.</a:t>
+            </a:r>
           </a:p>
           <a:p>
             <a:endParaRPr lang="en-US" dirty="0"/>
@@ -10599,10 +10559,9 @@
           <a:lstStyle/>
           <a:p>
             <a:r>
-              <a:rPr lang="en-US" dirty="0" smtClean="0"/>
+              <a:rPr lang="en-US" dirty="0"/>
               <a:t>Reverse Splicer</a:t>
             </a:r>
-            <a:endParaRPr lang="en-US" dirty="0"/>
           </a:p>
         </p:txBody>
       </p:sp>
@@ -10628,52 +10587,26 @@
           <a:p>
             <a:r>
               <a:rPr lang="en-US" dirty="0"/>
-              <a:t>Takes a FASTA file of peptides and a second FASTA file of </a:t>
-            </a:r>
-            <a:r>
-              <a:rPr lang="en-US" dirty="0" smtClean="0"/>
-              <a:t>proteins as input. </a:t>
-            </a:r>
-          </a:p>
-          <a:p>
-            <a:r>
-              <a:rPr lang="en-US" dirty="0" smtClean="0"/>
-              <a:t>Returns an excel file containing where </a:t>
-            </a:r>
-            <a:r>
-              <a:rPr lang="en-US" dirty="0"/>
-              <a:t>each peptide could have been produced from in the protein </a:t>
-            </a:r>
-            <a:r>
-              <a:rPr lang="en-US" dirty="0" smtClean="0"/>
-              <a:t>list.</a:t>
-            </a:r>
-            <a:endParaRPr lang="en-US" dirty="0"/>
-          </a:p>
-          <a:p>
-            <a:r>
-              <a:rPr lang="en-US" dirty="0"/>
-              <a:t>Returns </a:t>
-            </a:r>
-            <a:r>
-              <a:rPr lang="en-US" dirty="0" smtClean="0"/>
-              <a:t>separate </a:t>
-            </a:r>
-            <a:r>
-              <a:rPr lang="en-US" dirty="0"/>
-              <a:t>outputs for linear, cis and </a:t>
-            </a:r>
-            <a:r>
-              <a:rPr lang="en-US" dirty="0" smtClean="0"/>
-              <a:t>trans.</a:t>
-            </a:r>
-          </a:p>
-          <a:p>
-            <a:r>
-              <a:rPr lang="en-US" dirty="0" smtClean="0"/>
+              <a:t>Takes a FASTA file of peptides and a second FASTA file of proteins as input. </a:t>
+            </a:r>
+          </a:p>
+          <a:p>
+            <a:r>
+              <a:rPr lang="en-US" dirty="0"/>
+              <a:t>Returns an excel file containing where each peptide could have been produced from in the protein list.</a:t>
+            </a:r>
+          </a:p>
+          <a:p>
+            <a:r>
+              <a:rPr lang="en-US" dirty="0"/>
+              <a:t>Returns separate outputs for linear, cis and trans.</a:t>
+            </a:r>
+          </a:p>
+          <a:p>
+            <a:r>
+              <a:rPr lang="en-US" dirty="0"/>
               <a:t>Leucine and Isoleucine are considered identical.</a:t>
             </a:r>
-            <a:endParaRPr lang="en-US" dirty="0" smtClean="0"/>
           </a:p>
         </p:txBody>
       </p:sp>
@@ -10747,18 +10680,17 @@
           <a:lstStyle/>
           <a:p>
             <a:r>
-              <a:rPr lang="en-US" dirty="0" smtClean="0"/>
+              <a:rPr lang="en-US" dirty="0"/>
               <a:t>Reverse Splicer </a:t>
             </a:r>
             <a:r>
-              <a:rPr lang="mr-IN" dirty="0" smtClean="0"/>
+              <a:rPr lang="mr-IN" dirty="0"/>
               <a:t>–</a:t>
             </a:r>
             <a:r>
-              <a:rPr lang="en-US" dirty="0" smtClean="0"/>
+              <a:rPr lang="en-US" dirty="0"/>
               <a:t> Linear Output</a:t>
             </a:r>
-            <a:endParaRPr lang="en-US" dirty="0"/>
           </a:p>
         </p:txBody>
       </p:sp>
@@ -10832,18 +10764,17 @@
           <a:lstStyle/>
           <a:p>
             <a:r>
-              <a:rPr lang="en-US" dirty="0" smtClean="0"/>
+              <a:rPr lang="en-US" dirty="0"/>
               <a:t>Reverse Splicer </a:t>
             </a:r>
             <a:r>
-              <a:rPr lang="mr-IN" dirty="0" smtClean="0"/>
+              <a:rPr lang="mr-IN" dirty="0"/>
               <a:t>–</a:t>
             </a:r>
             <a:r>
-              <a:rPr lang="en-US" dirty="0" smtClean="0"/>
+              <a:rPr lang="en-US" dirty="0"/>
               <a:t> Cis Output</a:t>
             </a:r>
-            <a:endParaRPr lang="en-US" dirty="0"/>
           </a:p>
         </p:txBody>
       </p:sp>
@@ -10917,18 +10848,17 @@
           <a:lstStyle/>
           <a:p>
             <a:r>
-              <a:rPr lang="en-US" dirty="0" smtClean="0"/>
+              <a:rPr lang="en-US" dirty="0"/>
               <a:t>Reverse Splicer </a:t>
             </a:r>
             <a:r>
-              <a:rPr lang="mr-IN" dirty="0" smtClean="0"/>
+              <a:rPr lang="mr-IN" dirty="0"/>
               <a:t>–</a:t>
             </a:r>
             <a:r>
-              <a:rPr lang="en-US" dirty="0" smtClean="0"/>
+              <a:rPr lang="en-US" dirty="0"/>
               <a:t> Trans Output</a:t>
             </a:r>
-            <a:endParaRPr lang="en-US" dirty="0"/>
           </a:p>
         </p:txBody>
       </p:sp>
@@ -10972,6 +10902,32 @@
 <file path=ppt/slides/slide24.xml><?xml version="1.0" encoding="utf-8"?>
 <p:sld xmlns:a="http://schemas.openxmlformats.org/drawingml/2006/main" xmlns:r="http://schemas.openxmlformats.org/officeDocument/2006/relationships" xmlns:p="http://schemas.openxmlformats.org/presentationml/2006/main">
   <p:cSld>
+    <p:bg>
+      <p:bgPr>
+        <a:gradFill rotWithShape="1">
+          <a:gsLst>
+            <a:gs pos="0">
+              <a:schemeClr val="bg2">
+                <a:tint val="90000"/>
+                <a:satMod val="92000"/>
+                <a:lumMod val="120000"/>
+              </a:schemeClr>
+            </a:gs>
+            <a:gs pos="100000">
+              <a:schemeClr val="bg2">
+                <a:shade val="98000"/>
+                <a:satMod val="120000"/>
+                <a:lumMod val="98000"/>
+              </a:schemeClr>
+            </a:gs>
+          </a:gsLst>
+          <a:path path="circle">
+            <a:fillToRect l="50000" t="50000" r="100000" b="100000"/>
+          </a:path>
+        </a:gradFill>
+        <a:effectLst/>
+      </p:bgPr>
+    </p:bg>
     <p:spTree>
       <p:nvGrpSpPr>
         <p:cNvPr id="1" name=""/>
@@ -10986,6 +10942,66 @@
           <a:chExt cx="0" cy="0"/>
         </a:xfrm>
       </p:grpSpPr>
+      <p:sp useBgFill="1">
+        <p:nvSpPr>
+          <p:cNvPr id="71" name="Rectangle 70">
+            <a:extLst>
+              <a:ext uri="{FF2B5EF4-FFF2-40B4-BE49-F238E27FC236}">
+                <a16:creationId xmlns:a16="http://schemas.microsoft.com/office/drawing/2014/main" id="{3F4C104D-5F30-4811-9376-566B26E4719A}"/>
+              </a:ext>
+              <a:ext uri="{C183D7F6-B498-43B3-948B-1728B52AA6E4}">
+                <adec:decorative xmlns:adec="http://schemas.microsoft.com/office/drawing/2017/decorative" val="1"/>
+              </a:ext>
+            </a:extLst>
+          </p:cNvPr>
+          <p:cNvSpPr>
+            <a:spLocks noGrp="1" noRot="1" noChangeAspect="1" noMove="1" noResize="1" noEditPoints="1" noAdjustHandles="1" noChangeArrowheads="1" noChangeShapeType="1" noTextEdit="1"/>
+          </p:cNvSpPr>
+          <p:nvPr>
+            <p:extLst>
+              <p:ext uri="{386F3935-93C4-4BCD-93E2-E3B085C9AB24}">
+                <p16:designElem xmlns:p16="http://schemas.microsoft.com/office/powerpoint/2015/main" val="1"/>
+              </p:ext>
+            </p:extLst>
+          </p:nvPr>
+        </p:nvSpPr>
+        <p:spPr>
+          <a:xfrm>
+            <a:off x="0" y="-786"/>
+            <a:ext cx="12192000" cy="6854038"/>
+          </a:xfrm>
+          <a:prstGeom prst="rect">
+            <a:avLst/>
+          </a:prstGeom>
+          <a:ln>
+            <a:noFill/>
+          </a:ln>
+        </p:spPr>
+        <p:style>
+          <a:lnRef idx="2">
+            <a:schemeClr val="accent1">
+              <a:shade val="50000"/>
+            </a:schemeClr>
+          </a:lnRef>
+          <a:fillRef idx="1">
+            <a:schemeClr val="accent1"/>
+          </a:fillRef>
+          <a:effectRef idx="0">
+            <a:schemeClr val="accent1"/>
+          </a:effectRef>
+          <a:fontRef idx="minor">
+            <a:schemeClr val="lt1"/>
+          </a:fontRef>
+        </p:style>
+        <p:txBody>
+          <a:bodyPr rtlCol="0" anchor="ctr"/>
+          <a:lstStyle/>
+          <a:p>
+            <a:pPr algn="ctr"/>
+            <a:endParaRPr lang="en-US"/>
+          </a:p>
+        </p:txBody>
+      </p:sp>
       <p:sp>
         <p:nvSpPr>
           <p:cNvPr id="2" name="Title 1"/>
@@ -10996,45 +11012,378 @@
             <p:ph type="title"/>
           </p:nvPr>
         </p:nvSpPr>
-        <p:spPr/>
-        <p:txBody>
-          <a:bodyPr/>
-          <a:lstStyle/>
-          <a:p>
-            <a:r>
-              <a:rPr lang="en-US" dirty="0" smtClean="0"/>
+        <p:spPr>
+          <a:xfrm>
+            <a:off x="649224" y="645106"/>
+            <a:ext cx="3650279" cy="1259894"/>
+          </a:xfrm>
+        </p:spPr>
+        <p:txBody>
+          <a:bodyPr>
+            <a:normAutofit/>
+          </a:bodyPr>
+          <a:lstStyle/>
+          <a:p>
+            <a:r>
+              <a:rPr lang="en-US" dirty="0"/>
               <a:t>Reverse MGF</a:t>
             </a:r>
+          </a:p>
+        </p:txBody>
+      </p:sp>
+      <p:sp>
+        <p:nvSpPr>
+          <p:cNvPr id="73" name="Rectangle 72">
+            <a:extLst>
+              <a:ext uri="{FF2B5EF4-FFF2-40B4-BE49-F238E27FC236}">
+                <a16:creationId xmlns:a16="http://schemas.microsoft.com/office/drawing/2014/main" id="{0815E34B-5D02-4E01-A936-E8E1C0AB6F12}"/>
+              </a:ext>
+              <a:ext uri="{C183D7F6-B498-43B3-948B-1728B52AA6E4}">
+                <adec:decorative xmlns:adec="http://schemas.microsoft.com/office/drawing/2017/decorative" val="1"/>
+              </a:ext>
+            </a:extLst>
+          </p:cNvPr>
+          <p:cNvSpPr>
+            <a:spLocks noGrp="1" noRot="1" noChangeAspect="1" noMove="1" noResize="1" noEditPoints="1" noAdjustHandles="1" noChangeArrowheads="1" noChangeShapeType="1" noTextEdit="1"/>
+          </p:cNvSpPr>
+          <p:nvPr>
+            <p:extLst>
+              <p:ext uri="{386F3935-93C4-4BCD-93E2-E3B085C9AB24}">
+                <p16:designElem xmlns:p16="http://schemas.microsoft.com/office/powerpoint/2015/main" val="1"/>
+              </p:ext>
+            </p:extLst>
+          </p:nvPr>
+        </p:nvSpPr>
+        <p:spPr>
+          <a:xfrm>
+            <a:off x="0" y="0"/>
+            <a:ext cx="182880" cy="6858000"/>
+          </a:xfrm>
+          <a:prstGeom prst="rect">
+            <a:avLst/>
+          </a:prstGeom>
+          <a:solidFill>
+            <a:schemeClr val="tx2"/>
+          </a:solidFill>
+          <a:ln>
+            <a:noFill/>
+          </a:ln>
+          <a:effectLst/>
+        </p:spPr>
+        <p:style>
+          <a:lnRef idx="1">
+            <a:schemeClr val="accent1"/>
+          </a:lnRef>
+          <a:fillRef idx="3">
+            <a:schemeClr val="accent1"/>
+          </a:fillRef>
+          <a:effectRef idx="2">
+            <a:schemeClr val="accent1"/>
+          </a:effectRef>
+          <a:fontRef idx="minor">
+            <a:schemeClr val="lt1"/>
+          </a:fontRef>
+        </p:style>
+      </p:sp>
+      <p:sp>
+        <p:nvSpPr>
+          <p:cNvPr id="3" name="Content Placeholder 2"/>
+          <p:cNvSpPr>
+            <a:spLocks noGrp="1"/>
+          </p:cNvSpPr>
+          <p:nvPr>
+            <p:ph idx="1"/>
+          </p:nvPr>
+        </p:nvSpPr>
+        <p:spPr>
+          <a:xfrm>
+            <a:off x="649225" y="2133600"/>
+            <a:ext cx="3650278" cy="3759253"/>
+          </a:xfrm>
+        </p:spPr>
+        <p:txBody>
+          <a:bodyPr>
+            <a:normAutofit/>
+          </a:bodyPr>
+          <a:lstStyle/>
+          <a:p>
+            <a:r>
+              <a:rPr lang="en-US" dirty="0"/>
+              <a:t>Takes an MGF file and FASTA file of peptides as input.</a:t>
+            </a:r>
+          </a:p>
+          <a:p>
+            <a:r>
+              <a:rPr lang="en-US" dirty="0"/>
+              <a:t>For each peptide, it computes every spectra in the MGF file that matches based on precursor mass comparison and b/y ion comparison.</a:t>
+            </a:r>
+          </a:p>
+          <a:p>
             <a:endParaRPr lang="en-US" dirty="0"/>
           </a:p>
         </p:txBody>
       </p:sp>
-      <p:sp>
-        <p:nvSpPr>
-          <p:cNvPr id="3" name="Content Placeholder 2"/>
-          <p:cNvSpPr>
-            <a:spLocks noGrp="1"/>
-          </p:cNvSpPr>
-          <p:nvPr>
-            <p:ph idx="1"/>
-          </p:nvPr>
-        </p:nvSpPr>
-        <p:spPr/>
-        <p:txBody>
-          <a:bodyPr/>
-          <a:lstStyle/>
-          <a:p>
-            <a:r>
-              <a:rPr lang="en-US" dirty="0" smtClean="0"/>
-              <a:t>Takes an MGF file and FASTA file of peptides as input.</a:t>
-            </a:r>
-          </a:p>
-          <a:p>
-            <a:r>
-              <a:rPr lang="en-US" dirty="0" smtClean="0"/>
-              <a:t>For each peptide, it computes which spectra in the MGF file match based on b/y ion and precursor mass comparison.</a:t>
-            </a:r>
-            <a:endParaRPr lang="en-US" dirty="0"/>
+      <p:pic>
+        <p:nvPicPr>
+          <p:cNvPr id="1026" name="Picture 2" descr="https://i.gyazo.com/e75a2dae42734646ef4dc07671178c79.png">
+            <a:extLst>
+              <a:ext uri="{FF2B5EF4-FFF2-40B4-BE49-F238E27FC236}">
+                <a16:creationId xmlns:a16="http://schemas.microsoft.com/office/drawing/2014/main" id="{99657304-B736-40E5-94B7-547654E69046}"/>
+              </a:ext>
+            </a:extLst>
+          </p:cNvPr>
+          <p:cNvPicPr>
+            <a:picLocks noChangeAspect="1" noChangeArrowheads="1"/>
+          </p:cNvPicPr>
+          <p:nvPr/>
+        </p:nvPicPr>
+        <p:blipFill>
+          <a:blip r:embed="rId3">
+            <a:extLst>
+              <a:ext uri="{28A0092B-C50C-407E-A947-70E740481C1C}">
+                <a14:useLocalDpi xmlns:a14="http://schemas.microsoft.com/office/drawing/2010/main" val="0"/>
+              </a:ext>
+            </a:extLst>
+          </a:blip>
+          <a:srcRect/>
+          <a:stretch>
+            <a:fillRect/>
+          </a:stretch>
+        </p:blipFill>
+        <p:spPr bwMode="auto">
+          <a:xfrm>
+            <a:off x="5388507" y="640080"/>
+            <a:ext cx="5415649" cy="5252773"/>
+          </a:xfrm>
+          <a:prstGeom prst="rect">
+            <a:avLst/>
+          </a:prstGeom>
+          <a:noFill/>
+          <a:extLst>
+            <a:ext uri="{909E8E84-426E-40DD-AFC4-6F175D3DCCD1}">
+              <a14:hiddenFill xmlns:a14="http://schemas.microsoft.com/office/drawing/2010/main">
+                <a:solidFill>
+                  <a:srgbClr val="FFFFFF"/>
+                </a:solidFill>
+              </a14:hiddenFill>
+            </a:ext>
+          </a:extLst>
+        </p:spPr>
+      </p:pic>
+      <p:sp>
+        <p:nvSpPr>
+          <p:cNvPr id="75" name="Freeform 11">
+            <a:extLst>
+              <a:ext uri="{FF2B5EF4-FFF2-40B4-BE49-F238E27FC236}">
+                <a16:creationId xmlns:a16="http://schemas.microsoft.com/office/drawing/2014/main" id="{7DE3414B-B032-4710-A468-D3285E38C5FF}"/>
+              </a:ext>
+              <a:ext uri="{C183D7F6-B498-43B3-948B-1728B52AA6E4}">
+                <adec:decorative xmlns:adec="http://schemas.microsoft.com/office/drawing/2017/decorative" val="1"/>
+              </a:ext>
+            </a:extLst>
+          </p:cNvPr>
+          <p:cNvSpPr>
+            <a:spLocks noGrp="1" noRot="1" noChangeAspect="1" noMove="1" noResize="1" noEditPoints="1" noAdjustHandles="1" noChangeArrowheads="1" noChangeShapeType="1" noTextEdit="1"/>
+          </p:cNvSpPr>
+          <p:nvPr>
+            <p:extLst>
+              <p:ext uri="{386F3935-93C4-4BCD-93E2-E3B085C9AB24}">
+                <p16:designElem xmlns:p16="http://schemas.microsoft.com/office/powerpoint/2015/main" val="1"/>
+              </p:ext>
+            </p:extLst>
+          </p:nvPr>
+        </p:nvSpPr>
+        <p:spPr>
+          <a:xfrm>
+            <a:off x="-1" y="6061223"/>
+            <a:ext cx="1038036" cy="506277"/>
+          </a:xfrm>
+          <a:custGeom>
+            <a:avLst/>
+            <a:gdLst>
+              <a:gd name="connsiteX0" fmla="*/ 0 w 1038036"/>
+              <a:gd name="connsiteY0" fmla="*/ 0 h 506277"/>
+              <a:gd name="connsiteX1" fmla="*/ 182880 w 1038036"/>
+              <a:gd name="connsiteY1" fmla="*/ 0 h 506277"/>
+              <a:gd name="connsiteX2" fmla="*/ 291705 w 1038036"/>
+              <a:gd name="connsiteY2" fmla="*/ 0 h 506277"/>
+              <a:gd name="connsiteX3" fmla="*/ 291705 w 1038036"/>
+              <a:gd name="connsiteY3" fmla="*/ 151 h 506277"/>
+              <a:gd name="connsiteX4" fmla="*/ 692049 w 1038036"/>
+              <a:gd name="connsiteY4" fmla="*/ 705 h 506277"/>
+              <a:gd name="connsiteX5" fmla="*/ 782744 w 1038036"/>
+              <a:gd name="connsiteY5" fmla="*/ 705 h 506277"/>
+              <a:gd name="connsiteX6" fmla="*/ 797001 w 1038036"/>
+              <a:gd name="connsiteY6" fmla="*/ 5473 h 506277"/>
+              <a:gd name="connsiteX7" fmla="*/ 801982 w 1038036"/>
+              <a:gd name="connsiteY7" fmla="*/ 10242 h 506277"/>
+              <a:gd name="connsiteX8" fmla="*/ 1030951 w 1038036"/>
+              <a:gd name="connsiteY8" fmla="*/ 239185 h 506277"/>
+              <a:gd name="connsiteX9" fmla="*/ 1030951 w 1038036"/>
+              <a:gd name="connsiteY9" fmla="*/ 267797 h 506277"/>
+              <a:gd name="connsiteX10" fmla="*/ 801982 w 1038036"/>
+              <a:gd name="connsiteY10" fmla="*/ 496740 h 506277"/>
+              <a:gd name="connsiteX11" fmla="*/ 797001 w 1038036"/>
+              <a:gd name="connsiteY11" fmla="*/ 501508 h 506277"/>
+              <a:gd name="connsiteX12" fmla="*/ 782744 w 1038036"/>
+              <a:gd name="connsiteY12" fmla="*/ 506277 h 506277"/>
+              <a:gd name="connsiteX13" fmla="*/ 692049 w 1038036"/>
+              <a:gd name="connsiteY13" fmla="*/ 506277 h 506277"/>
+              <a:gd name="connsiteX14" fmla="*/ 291705 w 1038036"/>
+              <a:gd name="connsiteY14" fmla="*/ 505140 h 506277"/>
+              <a:gd name="connsiteX15" fmla="*/ 291705 w 1038036"/>
+              <a:gd name="connsiteY15" fmla="*/ 506277 h 506277"/>
+              <a:gd name="connsiteX16" fmla="*/ 0 w 1038036"/>
+              <a:gd name="connsiteY16" fmla="*/ 506277 h 506277"/>
+            </a:gdLst>
+            <a:ahLst/>
+            <a:cxnLst>
+              <a:cxn ang="0">
+                <a:pos x="connsiteX0" y="connsiteY0"/>
+              </a:cxn>
+              <a:cxn ang="0">
+                <a:pos x="connsiteX1" y="connsiteY1"/>
+              </a:cxn>
+              <a:cxn ang="0">
+                <a:pos x="connsiteX2" y="connsiteY2"/>
+              </a:cxn>
+              <a:cxn ang="0">
+                <a:pos x="connsiteX3" y="connsiteY3"/>
+              </a:cxn>
+              <a:cxn ang="0">
+                <a:pos x="connsiteX4" y="connsiteY4"/>
+              </a:cxn>
+              <a:cxn ang="0">
+                <a:pos x="connsiteX5" y="connsiteY5"/>
+              </a:cxn>
+              <a:cxn ang="0">
+                <a:pos x="connsiteX6" y="connsiteY6"/>
+              </a:cxn>
+              <a:cxn ang="0">
+                <a:pos x="connsiteX7" y="connsiteY7"/>
+              </a:cxn>
+              <a:cxn ang="0">
+                <a:pos x="connsiteX8" y="connsiteY8"/>
+              </a:cxn>
+              <a:cxn ang="0">
+                <a:pos x="connsiteX9" y="connsiteY9"/>
+              </a:cxn>
+              <a:cxn ang="0">
+                <a:pos x="connsiteX10" y="connsiteY10"/>
+              </a:cxn>
+              <a:cxn ang="0">
+                <a:pos x="connsiteX11" y="connsiteY11"/>
+              </a:cxn>
+              <a:cxn ang="0">
+                <a:pos x="connsiteX12" y="connsiteY12"/>
+              </a:cxn>
+              <a:cxn ang="0">
+                <a:pos x="connsiteX13" y="connsiteY13"/>
+              </a:cxn>
+              <a:cxn ang="0">
+                <a:pos x="connsiteX14" y="connsiteY14"/>
+              </a:cxn>
+              <a:cxn ang="0">
+                <a:pos x="connsiteX15" y="connsiteY15"/>
+              </a:cxn>
+              <a:cxn ang="0">
+                <a:pos x="connsiteX16" y="connsiteY16"/>
+              </a:cxn>
+            </a:cxnLst>
+            <a:rect l="l" t="t" r="r" b="b"/>
+            <a:pathLst>
+              <a:path w="1038036" h="506277">
+                <a:moveTo>
+                  <a:pt x="0" y="0"/>
+                </a:moveTo>
+                <a:lnTo>
+                  <a:pt x="182880" y="0"/>
+                </a:lnTo>
+                <a:lnTo>
+                  <a:pt x="291705" y="0"/>
+                </a:lnTo>
+                <a:lnTo>
+                  <a:pt x="291705" y="151"/>
+                </a:lnTo>
+                <a:lnTo>
+                  <a:pt x="692049" y="705"/>
+                </a:lnTo>
+                <a:lnTo>
+                  <a:pt x="782744" y="705"/>
+                </a:lnTo>
+                <a:cubicBezTo>
+                  <a:pt x="787553" y="705"/>
+                  <a:pt x="792363" y="5473"/>
+                  <a:pt x="797001" y="5473"/>
+                </a:cubicBezTo>
+                <a:cubicBezTo>
+                  <a:pt x="797001" y="10242"/>
+                  <a:pt x="801982" y="10242"/>
+                  <a:pt x="801982" y="10242"/>
+                </a:cubicBezTo>
+                <a:lnTo>
+                  <a:pt x="1030951" y="239185"/>
+                </a:lnTo>
+                <a:cubicBezTo>
+                  <a:pt x="1040398" y="248722"/>
+                  <a:pt x="1040398" y="258259"/>
+                  <a:pt x="1030951" y="267797"/>
+                </a:cubicBezTo>
+                <a:lnTo>
+                  <a:pt x="801982" y="496740"/>
+                </a:lnTo>
+                <a:cubicBezTo>
+                  <a:pt x="800436" y="498363"/>
+                  <a:pt x="798547" y="499885"/>
+                  <a:pt x="797001" y="501508"/>
+                </a:cubicBezTo>
+                <a:cubicBezTo>
+                  <a:pt x="792363" y="506277"/>
+                  <a:pt x="787553" y="506277"/>
+                  <a:pt x="782744" y="506277"/>
+                </a:cubicBezTo>
+                <a:lnTo>
+                  <a:pt x="692049" y="506277"/>
+                </a:lnTo>
+                <a:lnTo>
+                  <a:pt x="291705" y="505140"/>
+                </a:lnTo>
+                <a:lnTo>
+                  <a:pt x="291705" y="506277"/>
+                </a:lnTo>
+                <a:lnTo>
+                  <a:pt x="0" y="506277"/>
+                </a:lnTo>
+                <a:close/>
+              </a:path>
+            </a:pathLst>
+          </a:custGeom>
+          <a:ln>
+            <a:noFill/>
+          </a:ln>
+        </p:spPr>
+        <p:style>
+          <a:lnRef idx="2">
+            <a:schemeClr val="accent1">
+              <a:shade val="50000"/>
+            </a:schemeClr>
+          </a:lnRef>
+          <a:fillRef idx="1">
+            <a:schemeClr val="accent1"/>
+          </a:fillRef>
+          <a:effectRef idx="0">
+            <a:schemeClr val="accent1"/>
+          </a:effectRef>
+          <a:fontRef idx="minor">
+            <a:schemeClr val="lt1"/>
+          </a:fontRef>
+        </p:style>
+        <p:txBody>
+          <a:bodyPr rtlCol="0" anchor="ctr"/>
+          <a:lstStyle/>
+          <a:p>
+            <a:pPr algn="ctr"/>
+            <a:endParaRPr lang="en-US"/>
           </a:p>
         </p:txBody>
       </p:sp>
@@ -11084,10 +11433,9 @@
           <a:lstStyle/>
           <a:p>
             <a:r>
-              <a:rPr lang="en-US" dirty="0" smtClean="0"/>
+              <a:rPr lang="en-US" dirty="0"/>
               <a:t>Future Work on These Programs</a:t>
             </a:r>
-            <a:endParaRPr lang="en-US" dirty="0"/>
           </a:p>
         </p:txBody>
       </p:sp>
@@ -11107,33 +11455,33 @@
           <a:lstStyle/>
           <a:p>
             <a:r>
-              <a:rPr lang="en-US" dirty="0" smtClean="0"/>
+              <a:rPr lang="en-US" dirty="0"/>
               <a:t>Run time tests on Reverse MGF and Reverse Splice</a:t>
             </a:r>
           </a:p>
           <a:p>
             <a:r>
-              <a:rPr lang="en-US" dirty="0" smtClean="0"/>
+              <a:rPr lang="en-US" dirty="0"/>
               <a:t>Possibly look to incorporate the Splicing Program memory threshold checking and process generation</a:t>
             </a:r>
           </a:p>
           <a:p>
             <a:r>
-              <a:rPr lang="en-US" dirty="0" smtClean="0"/>
+              <a:rPr lang="en-US" dirty="0"/>
               <a:t>Documentation</a:t>
             </a:r>
             <a:r>
-              <a:rPr lang="mr-IN" dirty="0" smtClean="0"/>
+              <a:rPr lang="mr-IN" dirty="0"/>
               <a:t>…</a:t>
             </a:r>
             <a:r>
-              <a:rPr lang="en-AU" dirty="0" smtClean="0"/>
+              <a:rPr lang="en-AU" dirty="0"/>
               <a:t>.</a:t>
             </a:r>
           </a:p>
           <a:p>
             <a:r>
-              <a:rPr lang="en-AU" dirty="0" smtClean="0"/>
+              <a:rPr lang="en-AU" dirty="0"/>
               <a:t>Look to run on MASSIVE is feasible</a:t>
             </a:r>
             <a:endParaRPr lang="en-US" dirty="0"/>
@@ -11186,10 +11534,9 @@
           <a:lstStyle/>
           <a:p>
             <a:r>
-              <a:rPr lang="en-US" dirty="0" smtClean="0"/>
+              <a:rPr lang="en-US" dirty="0"/>
               <a:t>Machine Learning</a:t>
             </a:r>
-            <a:endParaRPr lang="en-US" dirty="0"/>
           </a:p>
         </p:txBody>
       </p:sp>
@@ -11214,37 +11561,33 @@
           <a:lstStyle/>
           <a:p>
             <a:r>
-              <a:rPr lang="en-US" dirty="0" smtClean="0"/>
-              <a:t>Predict b/y ion intensity based on </a:t>
-            </a:r>
-            <a:r>
-              <a:rPr lang="en-US" dirty="0" smtClean="0"/>
-              <a:t>the precursor sequence and b/y ion sequence.</a:t>
-            </a:r>
-          </a:p>
-          <a:p>
-            <a:r>
-              <a:rPr lang="en-US" dirty="0" smtClean="0"/>
+              <a:rPr lang="en-US" dirty="0"/>
+              <a:t>Predict b/y ion intensity based on the precursor sequence and b/y ion sequence.</a:t>
+            </a:r>
+          </a:p>
+          <a:p>
+            <a:r>
+              <a:rPr lang="en-US" dirty="0"/>
               <a:t>Currently ion intensities are not used effectively in the peptide prediction process.</a:t>
             </a:r>
           </a:p>
           <a:p>
             <a:pPr lvl="1"/>
             <a:r>
-              <a:rPr lang="en-US" dirty="0" smtClean="0"/>
+              <a:rPr lang="en-US" dirty="0"/>
               <a:t>We have only been using m/z of spectra in our program.</a:t>
             </a:r>
           </a:p>
           <a:p>
             <a:r>
-              <a:rPr lang="en-US" dirty="0" smtClean="0"/>
+              <a:rPr lang="en-US" dirty="0"/>
               <a:t>A number of projects have successfully used ion sequence data to predict intensity.</a:t>
             </a:r>
           </a:p>
           <a:p>
             <a:pPr lvl="1"/>
             <a:r>
-              <a:rPr lang="en-US" dirty="0" smtClean="0"/>
+              <a:rPr lang="en-US" dirty="0"/>
               <a:t>To incorporate it into our programs we were hoping to specifically do so for b/y ions.</a:t>
             </a:r>
           </a:p>
@@ -11324,18 +11667,17 @@
           <a:lstStyle/>
           <a:p>
             <a:r>
-              <a:rPr lang="en-US" dirty="0" smtClean="0"/>
+              <a:rPr lang="en-US" dirty="0"/>
               <a:t>Machine Learning </a:t>
             </a:r>
             <a:r>
-              <a:rPr lang="mr-IN" dirty="0" smtClean="0"/>
+              <a:rPr lang="mr-IN" dirty="0"/>
               <a:t>–</a:t>
             </a:r>
             <a:r>
-              <a:rPr lang="en-US" dirty="0" smtClean="0"/>
+              <a:rPr lang="en-US" dirty="0"/>
               <a:t> Basic Neural Network</a:t>
             </a:r>
-            <a:endParaRPr lang="en-US" dirty="0"/>
           </a:p>
         </p:txBody>
       </p:sp>
@@ -11360,16 +11702,15 @@
           <a:lstStyle/>
           <a:p>
             <a:r>
-              <a:rPr lang="en-US" dirty="0" smtClean="0"/>
+              <a:rPr lang="en-US" dirty="0"/>
               <a:t>Early attempts to solve this problem used simple neural nets with 1 or two hidden layers.</a:t>
             </a:r>
           </a:p>
           <a:p>
             <a:r>
-              <a:rPr lang="en-US" dirty="0" smtClean="0"/>
+              <a:rPr lang="en-US" dirty="0"/>
               <a:t>It was shown to improve peptide recognition when incorporated into existing workflows.</a:t>
             </a:r>
-            <a:endParaRPr lang="en-US" dirty="0"/>
           </a:p>
         </p:txBody>
       </p:sp>
@@ -11424,13 +11765,6 @@
   <p:clrMapOvr>
     <a:masterClrMapping/>
   </p:clrMapOvr>
-  <p:timing>
-    <p:tnLst>
-      <p:par>
-        <p:cTn id="1" dur="indefinite" restart="never" nodeType="tmRoot"/>
-      </p:par>
-    </p:tnLst>
-  </p:timing>
 </p:sld>
 </file>
 
@@ -11471,14 +11805,13 @@
               <a:t>Machine Learning </a:t>
             </a:r>
             <a:r>
-              <a:rPr lang="mr-IN" dirty="0" smtClean="0"/>
+              <a:rPr lang="mr-IN" dirty="0"/>
               <a:t>–</a:t>
             </a:r>
             <a:r>
-              <a:rPr lang="en-US" dirty="0" smtClean="0"/>
+              <a:rPr lang="en-US" dirty="0"/>
               <a:t> Recurrent Neural Networks</a:t>
             </a:r>
-            <a:endParaRPr lang="en-US" dirty="0"/>
           </a:p>
         </p:txBody>
       </p:sp>
@@ -11503,29 +11836,28 @@
           <a:lstStyle/>
           <a:p>
             <a:r>
-              <a:rPr lang="en-US" dirty="0" smtClean="0"/>
+              <a:rPr lang="en-US" dirty="0"/>
               <a:t>More recent work has shown recurrent neural networks are superior for intensity prediction.</a:t>
             </a:r>
           </a:p>
           <a:p>
             <a:r>
-              <a:rPr lang="en-US" dirty="0" smtClean="0"/>
+              <a:rPr lang="en-US" dirty="0"/>
               <a:t>Instead of taking an individual input and calculating the output, recurrent networks take a set of inputs and calculate the corresponding set of outputs simultaneously.</a:t>
             </a:r>
           </a:p>
           <a:p>
             <a:pPr lvl="1"/>
             <a:r>
-              <a:rPr lang="en-US" dirty="0" smtClean="0"/>
+              <a:rPr lang="en-US" dirty="0"/>
               <a:t>They take into account the result of the previous output when calculating a given output</a:t>
             </a:r>
           </a:p>
           <a:p>
             <a:r>
-              <a:rPr lang="en-US" dirty="0" smtClean="0"/>
+              <a:rPr lang="en-US" dirty="0"/>
               <a:t>Such a network would be able to predict how the intensities of a previous b/y ion pair affect the intensities of the next pair. </a:t>
             </a:r>
-            <a:endParaRPr lang="en-US" dirty="0"/>
           </a:p>
         </p:txBody>
       </p:sp>
@@ -11580,13 +11912,6 @@
   <p:clrMapOvr>
     <a:masterClrMapping/>
   </p:clrMapOvr>
-  <p:timing>
-    <p:tnLst>
-      <p:par>
-        <p:cTn id="1" dur="indefinite" restart="never" nodeType="tmRoot"/>
-      </p:par>
-    </p:tnLst>
-  </p:timing>
 </p:sld>
 </file>
 
@@ -11623,18 +11948,17 @@
           <a:lstStyle/>
           <a:p>
             <a:r>
-              <a:rPr lang="en-US" dirty="0" smtClean="0"/>
+              <a:rPr lang="en-US" dirty="0"/>
               <a:t>Machine Learning </a:t>
             </a:r>
             <a:r>
-              <a:rPr lang="mr-IN" dirty="0" smtClean="0"/>
+              <a:rPr lang="mr-IN" dirty="0"/>
               <a:t>–</a:t>
             </a:r>
             <a:r>
-              <a:rPr lang="en-US" dirty="0" smtClean="0"/>
+              <a:rPr lang="en-US" dirty="0"/>
               <a:t> Our Proposed Model</a:t>
             </a:r>
-            <a:endParaRPr lang="en-US" dirty="0"/>
           </a:p>
         </p:txBody>
       </p:sp>
@@ -11661,109 +11985,101 @@
           <a:lstStyle/>
           <a:p>
             <a:r>
-              <a:rPr lang="en-US" dirty="0" smtClean="0"/>
+              <a:rPr lang="en-US" dirty="0"/>
               <a:t>Bi-lateral recurrent neural network: considers the output before AND after when calculating a given predicted intensity</a:t>
             </a:r>
           </a:p>
           <a:p>
             <a:r>
-              <a:rPr lang="en-US" dirty="0" smtClean="0"/>
+              <a:rPr lang="en-US" dirty="0"/>
               <a:t>Treat a b/y ion cleavage site as a unique input</a:t>
             </a:r>
           </a:p>
           <a:p>
             <a:r>
               <a:rPr lang="en-US" dirty="0"/>
-              <a:t>For each protein we have a set cleavage site </a:t>
-            </a:r>
-            <a:r>
-              <a:rPr lang="en-US" dirty="0" smtClean="0"/>
-              <a:t>inputs which is fed into the network</a:t>
-            </a:r>
-          </a:p>
-          <a:p>
-            <a:r>
-              <a:rPr lang="en-US" dirty="0" smtClean="0"/>
+              <a:t>For each protein we have a set cleavage site inputs which is fed into the network</a:t>
+            </a:r>
+          </a:p>
+          <a:p>
+            <a:r>
+              <a:rPr lang="en-US" dirty="0"/>
               <a:t>Each input includes the following data:</a:t>
             </a:r>
           </a:p>
           <a:p>
             <a:pPr lvl="1"/>
             <a:r>
-              <a:rPr lang="en-US" dirty="0" smtClean="0"/>
+              <a:rPr lang="en-US" dirty="0"/>
               <a:t>Encoded precursor sequence </a:t>
             </a:r>
           </a:p>
           <a:p>
             <a:pPr lvl="1"/>
             <a:r>
-              <a:rPr lang="en-US" dirty="0" err="1" smtClean="0"/>
+              <a:rPr lang="en-US" dirty="0" err="1"/>
               <a:t>Normalised</a:t>
             </a:r>
             <a:r>
               <a:rPr lang="en-US" dirty="0"/>
-              <a:t> </a:t>
-            </a:r>
-            <a:r>
-              <a:rPr lang="en-US" dirty="0" smtClean="0"/>
-              <a:t>precursor mass</a:t>
+              <a:t> precursor mass</a:t>
             </a:r>
           </a:p>
           <a:p>
             <a:pPr lvl="1"/>
             <a:r>
-              <a:rPr lang="en-US" dirty="0" err="1" smtClean="0"/>
+              <a:rPr lang="en-US" dirty="0" err="1"/>
               <a:t>Normalised</a:t>
             </a:r>
             <a:r>
-              <a:rPr lang="en-US" dirty="0" smtClean="0"/>
+              <a:rPr lang="en-US" dirty="0"/>
               <a:t> precursor length</a:t>
             </a:r>
           </a:p>
           <a:p>
             <a:pPr lvl="1"/>
             <a:r>
-              <a:rPr lang="en-US" dirty="0" smtClean="0"/>
+              <a:rPr lang="en-US" dirty="0"/>
               <a:t>Encoded first and last amino acids</a:t>
             </a:r>
           </a:p>
           <a:p>
             <a:pPr lvl="1"/>
             <a:r>
-              <a:rPr lang="en-US" dirty="0" err="1" smtClean="0"/>
+              <a:rPr lang="en-US" dirty="0" err="1"/>
               <a:t>Normalised</a:t>
             </a:r>
             <a:r>
-              <a:rPr lang="en-US" dirty="0" smtClean="0"/>
+              <a:rPr lang="en-US" dirty="0"/>
               <a:t> b/y ion lengths</a:t>
             </a:r>
           </a:p>
           <a:p>
             <a:pPr lvl="1"/>
             <a:r>
-              <a:rPr lang="en-US" dirty="0" err="1" smtClean="0"/>
+              <a:rPr lang="en-US" dirty="0" err="1"/>
               <a:t>Normalised</a:t>
             </a:r>
             <a:r>
-              <a:rPr lang="en-US" dirty="0" smtClean="0"/>
+              <a:rPr lang="en-US" dirty="0"/>
               <a:t> b/y ion mass</a:t>
             </a:r>
           </a:p>
           <a:p>
             <a:pPr lvl="1"/>
             <a:r>
-              <a:rPr lang="en-US" dirty="0" err="1" smtClean="0"/>
+              <a:rPr lang="en-US" dirty="0" err="1"/>
               <a:t>Normalised</a:t>
             </a:r>
             <a:r>
-              <a:rPr lang="en-US" dirty="0" smtClean="0"/>
+              <a:rPr lang="en-US" dirty="0"/>
               <a:t> cleavage site number</a:t>
             </a:r>
           </a:p>
           <a:p>
             <a:pPr lvl="1"/>
             <a:r>
-              <a:rPr lang="en-US" dirty="0" smtClean="0"/>
+              <a:rPr lang="en-US" dirty="0"/>
               <a:t>Encoded amino acids either side of cleavage site</a:t>
             </a:r>
           </a:p>
@@ -11895,10 +12211,9 @@
           <a:lstStyle/>
           <a:p>
             <a:r>
-              <a:rPr lang="en-US" dirty="0" smtClean="0"/>
+              <a:rPr lang="en-US" dirty="0"/>
               <a:t>Machine Learning - Progress</a:t>
             </a:r>
-            <a:endParaRPr lang="en-US" dirty="0"/>
           </a:p>
         </p:txBody>
       </p:sp>
@@ -11918,33 +12233,33 @@
           <a:lstStyle/>
           <a:p>
             <a:r>
-              <a:rPr lang="en-US" dirty="0" smtClean="0"/>
+              <a:rPr lang="en-US" dirty="0"/>
               <a:t>We have written the basic code to to create the network.</a:t>
             </a:r>
           </a:p>
           <a:p>
             <a:r>
-              <a:rPr lang="en-US" dirty="0" smtClean="0"/>
+              <a:rPr lang="en-US" dirty="0"/>
               <a:t>Haven’t had time to fine tune the model and set hyper parameters.</a:t>
             </a:r>
           </a:p>
           <a:p>
             <a:pPr lvl="1"/>
             <a:r>
-              <a:rPr lang="en-US" dirty="0" smtClean="0"/>
+              <a:rPr lang="en-US" dirty="0"/>
               <a:t>This is the real challenge in neural network design.</a:t>
             </a:r>
           </a:p>
           <a:p>
             <a:r>
-              <a:rPr lang="en-US" dirty="0" smtClean="0"/>
+              <a:rPr lang="en-US" dirty="0"/>
               <a:t>Ideally, the neural network would be incorporated into our other programs to provide more confident matches between MGF spectra and potential peptides.</a:t>
             </a:r>
           </a:p>
           <a:p>
             <a:pPr lvl="1"/>
             <a:r>
-              <a:rPr lang="en-US" dirty="0" smtClean="0"/>
+              <a:rPr lang="en-US" dirty="0"/>
               <a:t>This is a big task, and we likely won’t have time.</a:t>
             </a:r>
           </a:p>
@@ -12073,15 +12388,7 @@
           <a:p>
             <a:r>
               <a:rPr lang="en-US" dirty="0"/>
-              <a:t>Output </a:t>
-            </a:r>
-            <a:r>
-              <a:rPr lang="en-US" dirty="0" smtClean="0"/>
-              <a:t>FASTA </a:t>
-            </a:r>
-            <a:r>
-              <a:rPr lang="en-US" dirty="0"/>
-              <a:t>File</a:t>
+              <a:t>Output FASTA File</a:t>
             </a:r>
           </a:p>
         </p:txBody>
@@ -12220,13 +12527,6 @@
   <p:clrMapOvr>
     <a:masterClrMapping/>
   </p:clrMapOvr>
-  <p:timing>
-    <p:tnLst>
-      <p:par>
-        <p:cTn id="1" dur="indefinite" restart="never" nodeType="tmRoot"/>
-      </p:par>
-    </p:tnLst>
-  </p:timing>
 </p:sld>
 </file>
 
@@ -12263,10 +12563,9 @@
           <a:lstStyle/>
           <a:p>
             <a:r>
-              <a:rPr lang="en-US" dirty="0" smtClean="0"/>
+              <a:rPr lang="en-US" dirty="0"/>
               <a:t>Flow of Program</a:t>
             </a:r>
-            <a:endParaRPr lang="en-US" dirty="0"/>
           </a:p>
         </p:txBody>
       </p:sp>
@@ -12387,10 +12686,9 @@
           <a:lstStyle/>
           <a:p>
             <a:r>
-              <a:rPr lang="en-US" dirty="0" smtClean="0"/>
+              <a:rPr lang="en-US" dirty="0"/>
               <a:t>New Functions</a:t>
             </a:r>
-            <a:endParaRPr lang="en-US" dirty="0"/>
           </a:p>
         </p:txBody>
       </p:sp>
@@ -12417,75 +12715,75 @@
           <a:lstStyle/>
           <a:p>
             <a:r>
-              <a:rPr lang="en-US" dirty="0" smtClean="0"/>
+              <a:rPr lang="en-US" dirty="0"/>
               <a:t>Upload of multiple FASTA files.</a:t>
             </a:r>
           </a:p>
           <a:p>
             <a:r>
-              <a:rPr lang="en-US" dirty="0" smtClean="0"/>
+              <a:rPr lang="en-US" dirty="0"/>
               <a:t>Produce output without input MGF file.</a:t>
             </a:r>
           </a:p>
           <a:p>
             <a:r>
-              <a:rPr lang="en-US" dirty="0" smtClean="0"/>
+              <a:rPr lang="en-US" dirty="0"/>
               <a:t>Max modification per peptide input.</a:t>
             </a:r>
           </a:p>
           <a:p>
             <a:r>
-              <a:rPr lang="en-US" dirty="0" smtClean="0"/>
+              <a:rPr lang="en-US" dirty="0"/>
               <a:t>New b/y ion comparison algorithm.</a:t>
             </a:r>
           </a:p>
           <a:p>
             <a:r>
-              <a:rPr lang="en-US" dirty="0" smtClean="0"/>
+              <a:rPr lang="en-US" dirty="0"/>
               <a:t>Allow user to input the output file name.</a:t>
             </a:r>
           </a:p>
           <a:p>
             <a:r>
-              <a:rPr lang="en-US" dirty="0" smtClean="0"/>
+              <a:rPr lang="en-US" dirty="0"/>
               <a:t>Added a progress bar which represents the proportion of the output completed.</a:t>
             </a:r>
           </a:p>
           <a:p>
             <a:r>
-              <a:rPr lang="en-US" dirty="0" smtClean="0"/>
+              <a:rPr lang="en-US" dirty="0"/>
               <a:t>Ensured linear peptides aren’t present in cis splicing, and linear and cis aren’t present in trans.</a:t>
             </a:r>
           </a:p>
           <a:p>
             <a:r>
-              <a:rPr lang="en-US" dirty="0" smtClean="0"/>
+              <a:rPr lang="en-US" dirty="0"/>
               <a:t>Added multiprocessing for trans splicing.</a:t>
             </a:r>
           </a:p>
           <a:p>
             <a:r>
-              <a:rPr lang="en-US" dirty="0" smtClean="0"/>
+              <a:rPr lang="en-US" dirty="0"/>
               <a:t>Removal of all peptides that exceed max monoisotopic mass of MGF file before MGF comparison occurs.</a:t>
             </a:r>
           </a:p>
           <a:p>
             <a:r>
-              <a:rPr lang="en-US" dirty="0" smtClean="0"/>
+              <a:rPr lang="en-US" dirty="0"/>
               <a:t>Check that input FASTA file has less than 2000 amino acids in total if trans selected.</a:t>
             </a:r>
           </a:p>
           <a:p>
             <a:r>
-              <a:rPr lang="en-US" dirty="0" smtClean="0"/>
+              <a:rPr lang="en-US" dirty="0"/>
               <a:t>Process generation changes and multiple outputs when memory threshold is reached.</a:t>
             </a:r>
           </a:p>
           <a:p>
-            <a:endParaRPr lang="en-US" dirty="0" smtClean="0"/>
-          </a:p>
-          <a:p>
-            <a:endParaRPr lang="en-US" dirty="0" smtClean="0"/>
+            <a:endParaRPr lang="en-US" dirty="0"/>
+          </a:p>
+          <a:p>
+            <a:endParaRPr lang="en-US" dirty="0"/>
           </a:p>
           <a:p>
             <a:endParaRPr lang="en-US" dirty="0"/>
@@ -12502,13 +12800,6 @@
   <p:clrMapOvr>
     <a:masterClrMapping/>
   </p:clrMapOvr>
-  <p:timing>
-    <p:tnLst>
-      <p:par>
-        <p:cTn id="1" dur="indefinite" restart="never" nodeType="tmRoot"/>
-      </p:par>
-    </p:tnLst>
-  </p:timing>
 </p:sld>
 </file>
 
@@ -12545,18 +12836,17 @@
           <a:lstStyle/>
           <a:p>
             <a:r>
-              <a:rPr lang="en-US" dirty="0" smtClean="0"/>
+              <a:rPr lang="en-US" dirty="0"/>
               <a:t>New Functions </a:t>
             </a:r>
             <a:r>
-              <a:rPr lang="mr-IN" dirty="0" smtClean="0"/>
+              <a:rPr lang="mr-IN" dirty="0"/>
               <a:t>–</a:t>
             </a:r>
             <a:r>
-              <a:rPr lang="en-US" dirty="0" smtClean="0"/>
+              <a:rPr lang="en-US" dirty="0"/>
               <a:t> Custom Modifications</a:t>
             </a:r>
-            <a:endParaRPr lang="en-US" dirty="0"/>
           </a:p>
         </p:txBody>
       </p:sp>
@@ -12581,22 +12871,21 @@
           <a:lstStyle/>
           <a:p>
             <a:r>
-              <a:rPr lang="en-US" dirty="0" smtClean="0"/>
+              <a:rPr lang="en-US" dirty="0"/>
               <a:t>Enables the user to create their own modifications.</a:t>
             </a:r>
           </a:p>
           <a:p>
             <a:r>
-              <a:rPr lang="en-US" dirty="0" smtClean="0"/>
+              <a:rPr lang="en-US" dirty="0"/>
               <a:t>Selecting ”Custom Mod” from the drop down box opens a new window.</a:t>
             </a:r>
           </a:p>
           <a:p>
             <a:r>
-              <a:rPr lang="en-US" dirty="0" smtClean="0"/>
+              <a:rPr lang="en-US" dirty="0"/>
               <a:t>The new mod is added to the list if all information has been input correctly. </a:t>
             </a:r>
-            <a:endParaRPr lang="en-US" dirty="0"/>
           </a:p>
         </p:txBody>
       </p:sp>
@@ -12658,13 +12947,6 @@
   <p:clrMapOvr>
     <a:masterClrMapping/>
   </p:clrMapOvr>
-  <p:timing>
-    <p:tnLst>
-      <p:par>
-        <p:cTn id="1" dur="indefinite" restart="never" nodeType="tmRoot"/>
-      </p:par>
-    </p:tnLst>
-  </p:timing>
 </p:sld>
 </file>
 

</xml_diff>